<commit_message>
Final proposal is done
</commit_message>
<xml_diff>
--- a/Peer Review/NH_Peer_Review_Assignment_4.pptx
+++ b/Peer Review/NH_Peer_Review_Assignment_4.pptx
@@ -8,17 +8,19 @@
     <p:sldId id="256" r:id="rId2"/>
     <p:sldId id="257" r:id="rId3"/>
     <p:sldId id="268" r:id="rId4"/>
-    <p:sldId id="258" r:id="rId5"/>
-    <p:sldId id="259" r:id="rId6"/>
-    <p:sldId id="260" r:id="rId7"/>
-    <p:sldId id="261" r:id="rId8"/>
-    <p:sldId id="262" r:id="rId9"/>
-    <p:sldId id="263" r:id="rId10"/>
-    <p:sldId id="264" r:id="rId11"/>
-    <p:sldId id="265" r:id="rId12"/>
-    <p:sldId id="266" r:id="rId13"/>
-    <p:sldId id="267" r:id="rId14"/>
-    <p:sldId id="269" r:id="rId15"/>
+    <p:sldId id="270" r:id="rId5"/>
+    <p:sldId id="258" r:id="rId6"/>
+    <p:sldId id="259" r:id="rId7"/>
+    <p:sldId id="260" r:id="rId8"/>
+    <p:sldId id="261" r:id="rId9"/>
+    <p:sldId id="262" r:id="rId10"/>
+    <p:sldId id="271" r:id="rId11"/>
+    <p:sldId id="263" r:id="rId12"/>
+    <p:sldId id="265" r:id="rId13"/>
+    <p:sldId id="264" r:id="rId14"/>
+    <p:sldId id="266" r:id="rId15"/>
+    <p:sldId id="267" r:id="rId16"/>
+    <p:sldId id="269" r:id="rId17"/>
   </p:sldIdLst>
   <p:sldSz cx="9144000" cy="6858000" type="screen4x3"/>
   <p:notesSz cx="6858000" cy="9144000"/>
@@ -339,7 +341,7 @@
           <a:p>
             <a:fld id="{0E5F570F-48AB-514E-A885-45C29518B4AF}" type="datetimeFigureOut">
               <a:rPr lang="en-US" smtClean="0"/>
-              <a:t>4/13/17</a:t>
+              <a:t>5/1/17</a:t>
             </a:fld>
             <a:endParaRPr lang="en-US"/>
           </a:p>
@@ -660,7 +662,7 @@
           <a:p>
             <a:fld id="{0E5F570F-48AB-514E-A885-45C29518B4AF}" type="datetimeFigureOut">
               <a:rPr lang="en-US" smtClean="0"/>
-              <a:t>4/13/17</a:t>
+              <a:t>5/1/17</a:t>
             </a:fld>
             <a:endParaRPr lang="en-US"/>
           </a:p>
@@ -937,7 +939,7 @@
           <a:p>
             <a:fld id="{0E5F570F-48AB-514E-A885-45C29518B4AF}" type="datetimeFigureOut">
               <a:rPr lang="en-US" smtClean="0"/>
-              <a:t>4/13/17</a:t>
+              <a:t>5/1/17</a:t>
             </a:fld>
             <a:endParaRPr lang="en-US"/>
           </a:p>
@@ -1231,7 +1233,7 @@
           <a:p>
             <a:fld id="{0E5F570F-48AB-514E-A885-45C29518B4AF}" type="datetimeFigureOut">
               <a:rPr lang="en-US" smtClean="0"/>
-              <a:t>4/13/17</a:t>
+              <a:t>5/1/17</a:t>
             </a:fld>
             <a:endParaRPr lang="en-US"/>
           </a:p>
@@ -1560,7 +1562,7 @@
           <a:p>
             <a:fld id="{0E5F570F-48AB-514E-A885-45C29518B4AF}" type="datetimeFigureOut">
               <a:rPr lang="en-US" smtClean="0"/>
-              <a:t>4/13/17</a:t>
+              <a:t>5/1/17</a:t>
             </a:fld>
             <a:endParaRPr lang="en-US"/>
           </a:p>
@@ -1811,7 +1813,7 @@
           <a:p>
             <a:fld id="{0E5F570F-48AB-514E-A885-45C29518B4AF}" type="datetimeFigureOut">
               <a:rPr lang="en-US" smtClean="0"/>
-              <a:t>4/13/17</a:t>
+              <a:t>5/1/17</a:t>
             </a:fld>
             <a:endParaRPr lang="en-US"/>
           </a:p>
@@ -1990,7 +1992,7 @@
           <a:p>
             <a:fld id="{0E5F570F-48AB-514E-A885-45C29518B4AF}" type="datetimeFigureOut">
               <a:rPr lang="en-US" smtClean="0"/>
-              <a:t>4/13/17</a:t>
+              <a:t>5/1/17</a:t>
             </a:fld>
             <a:endParaRPr lang="en-US"/>
           </a:p>
@@ -2159,7 +2161,7 @@
           <a:p>
             <a:fld id="{0E5F570F-48AB-514E-A885-45C29518B4AF}" type="datetimeFigureOut">
               <a:rPr lang="en-US" smtClean="0"/>
-              <a:t>4/13/17</a:t>
+              <a:t>5/1/17</a:t>
             </a:fld>
             <a:endParaRPr lang="en-US"/>
           </a:p>
@@ -2428,7 +2430,7 @@
           <a:p>
             <a:fld id="{0E5F570F-48AB-514E-A885-45C29518B4AF}" type="datetimeFigureOut">
               <a:rPr lang="en-US" smtClean="0"/>
-              <a:t>4/13/17</a:t>
+              <a:t>5/1/17</a:t>
             </a:fld>
             <a:endParaRPr lang="en-US"/>
           </a:p>
@@ -2735,7 +2737,7 @@
           <a:p>
             <a:fld id="{0E5F570F-48AB-514E-A885-45C29518B4AF}" type="datetimeFigureOut">
               <a:rPr lang="en-US" smtClean="0"/>
-              <a:t>4/13/17</a:t>
+              <a:t>5/1/17</a:t>
             </a:fld>
             <a:endParaRPr lang="en-US"/>
           </a:p>
@@ -3027,7 +3029,7 @@
           <a:p>
             <a:fld id="{0E5F570F-48AB-514E-A885-45C29518B4AF}" type="datetimeFigureOut">
               <a:rPr lang="en-US" smtClean="0"/>
-              <a:t>4/13/17</a:t>
+              <a:t>5/1/17</a:t>
             </a:fld>
             <a:endParaRPr lang="en-US"/>
           </a:p>
@@ -3457,7 +3459,7 @@
           <a:p>
             <a:fld id="{0E5F570F-48AB-514E-A885-45C29518B4AF}" type="datetimeFigureOut">
               <a:rPr lang="en-US" smtClean="0"/>
-              <a:t>4/13/17</a:t>
+              <a:t>5/1/17</a:t>
             </a:fld>
             <a:endParaRPr lang="en-US"/>
           </a:p>
@@ -3803,7 +3805,7 @@
           <a:p>
             <a:fld id="{0E5F570F-48AB-514E-A885-45C29518B4AF}" type="datetimeFigureOut">
               <a:rPr lang="en-US" smtClean="0"/>
-              <a:t>4/13/17</a:t>
+              <a:t>5/1/17</a:t>
             </a:fld>
             <a:endParaRPr lang="en-US"/>
           </a:p>
@@ -3893,7 +3895,7 @@
           <a:p>
             <a:fld id="{0E5F570F-48AB-514E-A885-45C29518B4AF}" type="datetimeFigureOut">
               <a:rPr lang="en-US" smtClean="0"/>
-              <a:t>4/13/17</a:t>
+              <a:t>5/1/17</a:t>
             </a:fld>
             <a:endParaRPr lang="en-US"/>
           </a:p>
@@ -4230,7 +4232,7 @@
           <a:p>
             <a:fld id="{0E5F570F-48AB-514E-A885-45C29518B4AF}" type="datetimeFigureOut">
               <a:rPr lang="en-US" smtClean="0"/>
-              <a:t>4/13/17</a:t>
+              <a:t>5/1/17</a:t>
             </a:fld>
             <a:endParaRPr lang="en-US"/>
           </a:p>
@@ -4442,7 +4444,7 @@
           <a:p>
             <a:fld id="{0E5F570F-48AB-514E-A885-45C29518B4AF}" type="datetimeFigureOut">
               <a:rPr lang="en-US" smtClean="0"/>
-              <a:t>4/13/17</a:t>
+              <a:t>5/1/17</a:t>
             </a:fld>
             <a:endParaRPr lang="en-US"/>
           </a:p>
@@ -4996,14 +4998,35 @@
         </p:spPr>
         <p:txBody>
           <a:bodyPr>
-            <a:normAutofit/>
+            <a:normAutofit fontScale="90000"/>
           </a:bodyPr>
           <a:lstStyle/>
           <a:p>
             <a:r>
               <a:rPr lang="en-US" dirty="0"/>
-              <a:t>“A Proposal to Improve the Enrollment and Retention of Women in Computer Science”</a:t>
-            </a:r>
+              <a:t>“</a:t>
+            </a:r>
+            <a:r>
+              <a:rPr lang="en-US" dirty="0" smtClean="0"/>
+              <a:t>An Instructional </a:t>
+            </a:r>
+            <a:r>
+              <a:rPr lang="en-US" dirty="0"/>
+              <a:t>P</a:t>
+            </a:r>
+            <a:r>
+              <a:rPr lang="en-US" dirty="0" smtClean="0"/>
+              <a:t>rogram to </a:t>
+            </a:r>
+            <a:r>
+              <a:rPr lang="en-US" dirty="0"/>
+              <a:t>Improve the Enrollment and Retention of Women in Computer </a:t>
+            </a:r>
+            <a:r>
+              <a:rPr lang="en-US" dirty="0" smtClean="0"/>
+              <a:t>Science at FRSD”</a:t>
+            </a:r>
+            <a:endParaRPr lang="en-US" dirty="0"/>
           </a:p>
         </p:txBody>
       </p:sp>
@@ -5024,19 +5047,68 @@
           <a:p>
             <a:r>
               <a:rPr lang="en-US" dirty="0" smtClean="0"/>
-              <a:t>Patron: Google Educational Grant</a:t>
-            </a:r>
-          </a:p>
-          <a:p>
-            <a:r>
-              <a:rPr lang="en-US" dirty="0" smtClean="0"/>
-              <a:t>Presenter: &lt;NAME HERE&gt;</a:t>
-            </a:r>
-          </a:p>
-          <a:p>
-            <a:r>
-              <a:rPr lang="en-US" dirty="0" smtClean="0"/>
-              <a:t>Presentation Date: 5/1/17, 2:30 pm</a:t>
+              <a:t>Patron: </a:t>
+            </a:r>
+            <a:r>
+              <a:rPr lang="en-US" dirty="0" smtClean="0"/>
+              <a:t>Mrs. Amy </a:t>
+            </a:r>
+            <a:r>
+              <a:rPr lang="en-US" dirty="0" err="1" smtClean="0"/>
+              <a:t>Qu</a:t>
+            </a:r>
+            <a:r>
+              <a:rPr lang="en-US" dirty="0"/>
+              <a:t> </a:t>
+            </a:r>
+            <a:r>
+              <a:rPr lang="mr-IN" dirty="0" smtClean="0"/>
+              <a:t>–</a:t>
+            </a:r>
+            <a:r>
+              <a:rPr lang="en-US" dirty="0" smtClean="0"/>
+              <a:t> Google College </a:t>
+            </a:r>
+            <a:r>
+              <a:rPr lang="en-US" dirty="0" err="1" smtClean="0"/>
+              <a:t>Liason</a:t>
+            </a:r>
+            <a:endParaRPr lang="en-US" dirty="0" smtClean="0"/>
+          </a:p>
+          <a:p>
+            <a:r>
+              <a:rPr lang="en-US" dirty="0" smtClean="0"/>
+              <a:t>Funding request: Google </a:t>
+            </a:r>
+            <a:r>
+              <a:rPr lang="en-US" dirty="0" smtClean="0"/>
+              <a:t>Educational </a:t>
+            </a:r>
+            <a:r>
+              <a:rPr lang="en-US" dirty="0" smtClean="0"/>
+              <a:t>Grant</a:t>
+            </a:r>
+            <a:endParaRPr lang="en-US" dirty="0" smtClean="0"/>
+          </a:p>
+          <a:p>
+            <a:r>
+              <a:rPr lang="en-US" dirty="0" smtClean="0"/>
+              <a:t>Presenter: </a:t>
+            </a:r>
+            <a:r>
+              <a:rPr lang="en-US" dirty="0" smtClean="0"/>
+              <a:t>Naeem Hossain</a:t>
+            </a:r>
+            <a:endParaRPr lang="en-US" dirty="0" smtClean="0"/>
+          </a:p>
+          <a:p>
+            <a:r>
+              <a:rPr lang="en-US" dirty="0" smtClean="0"/>
+              <a:t>Presentation Date: 5/1/</a:t>
+            </a:r>
+            <a:r>
+              <a:rPr lang="en-US" dirty="0" smtClean="0"/>
+              <a:t>17</a:t>
             </a:r>
             <a:endParaRPr lang="en-US" dirty="0"/>
           </a:p>
@@ -5058,8 +5130,8 @@
         </p:blipFill>
         <p:spPr>
           <a:xfrm>
-            <a:off x="1249293" y="4789395"/>
-            <a:ext cx="3656249" cy="1779697"/>
+            <a:off x="4318008" y="4503411"/>
+            <a:ext cx="4243783" cy="2065682"/>
           </a:xfrm>
           <a:prstGeom prst="rect">
             <a:avLst/>
@@ -5076,6 +5148,13 @@
   <p:clrMapOvr>
     <a:masterClrMapping/>
   </p:clrMapOvr>
+  <p:timing>
+    <p:tnLst>
+      <p:par>
+        <p:cTn xmlns:p14="http://schemas.microsoft.com/office/powerpoint/2010/main" id="1" dur="indefinite" restart="never" nodeType="tmRoot"/>
+      </p:par>
+    </p:tnLst>
+  </p:timing>
 </p:sld>
 </file>
 
@@ -5113,7 +5192,7 @@
           <a:p>
             <a:r>
               <a:rPr lang="en-US" dirty="0" smtClean="0"/>
-              <a:t>Budget</a:t>
+              <a:t>Model: Microsoft TEALS</a:t>
             </a:r>
             <a:endParaRPr lang="en-US" dirty="0"/>
           </a:p>
@@ -5132,88 +5211,133 @@
         <p:spPr/>
         <p:txBody>
           <a:bodyPr>
-            <a:normAutofit/>
+            <a:normAutofit fontScale="92500"/>
           </a:bodyPr>
           <a:lstStyle/>
           <a:p>
             <a:r>
               <a:rPr lang="en-US" dirty="0" smtClean="0"/>
-              <a:t>Laptops</a:t>
+              <a:t>Technology Education and Literacy in Schools. In-school tutoring program that teaches computer science in-school through teacher-partnership programs</a:t>
             </a:r>
           </a:p>
           <a:p>
             <a:pPr lvl="1"/>
             <a:r>
               <a:rPr lang="en-US" dirty="0" smtClean="0"/>
-              <a:t>Lenovo M23 </a:t>
-            </a:r>
-            <a:r>
-              <a:rPr lang="en-US" dirty="0" err="1" smtClean="0"/>
-              <a:t>Chromebook</a:t>
-            </a:r>
-            <a:r>
-              <a:rPr lang="en-US" dirty="0" smtClean="0"/>
-              <a:t> Laptops ($5370.00)</a:t>
-            </a:r>
-          </a:p>
-          <a:p>
-            <a:r>
-              <a:rPr lang="en-US" dirty="0" smtClean="0"/>
-              <a:t>Transportation</a:t>
+              <a:t>Basically volunteers act as TA’s in a class and help the teacher</a:t>
             </a:r>
           </a:p>
           <a:p>
             <a:pPr lvl="1"/>
             <a:r>
               <a:rPr lang="en-US" dirty="0" smtClean="0"/>
-              <a:t>Subsidies for transportation ($1800.00)</a:t>
-            </a:r>
-          </a:p>
-          <a:p>
-            <a:r>
-              <a:rPr lang="en-US" dirty="0" smtClean="0"/>
-              <a:t>Teaching supplies ($300)</a:t>
+              <a:t>Aimed at beginner teachers and students</a:t>
             </a:r>
           </a:p>
           <a:p>
             <a:pPr lvl="1"/>
             <a:r>
-              <a:rPr lang="en-US" dirty="0"/>
-              <a:t>Pens, pencils, notepads, etc.</a:t>
+              <a:rPr lang="en-US" dirty="0" smtClean="0"/>
+              <a:t>Revenue-neutral</a:t>
             </a:r>
           </a:p>
           <a:p>
             <a:pPr lvl="1"/>
             <a:r>
-              <a:rPr lang="en-US" dirty="0"/>
-              <a:t>Whiteboards, markers, etc. </a:t>
-            </a:r>
+              <a:rPr lang="en-US" dirty="0" smtClean="0"/>
+              <a:t>Results:</a:t>
+            </a:r>
+          </a:p>
+          <a:p>
+            <a:pPr lvl="2"/>
+            <a:r>
+              <a:rPr lang="en-US" dirty="0" smtClean="0"/>
+              <a:t>750 volunteers from 400</a:t>
+            </a:r>
+          </a:p>
+          <a:p>
+            <a:pPr marL="1035050" lvl="3" indent="0">
+              <a:buNone/>
+            </a:pPr>
+            <a:r>
+              <a:rPr lang="en-US" dirty="0" smtClean="0"/>
+              <a:t>companies</a:t>
+            </a:r>
+          </a:p>
+          <a:p>
+            <a:pPr lvl="2"/>
+            <a:r>
+              <a:rPr lang="en-US" dirty="0" smtClean="0"/>
+              <a:t>10% increase in CS exam </a:t>
+            </a:r>
+          </a:p>
+          <a:p>
+            <a:pPr marL="1035050" lvl="3" indent="0">
+              <a:buNone/>
+            </a:pPr>
+            <a:r>
+              <a:rPr lang="en-US" dirty="0" smtClean="0"/>
+              <a:t>scores</a:t>
+            </a:r>
+          </a:p>
+          <a:p>
+            <a:pPr marL="349250" lvl="1" indent="0">
+              <a:buNone/>
+            </a:pPr>
             <a:endParaRPr lang="en-US" dirty="0" smtClean="0"/>
           </a:p>
           <a:p>
-            <a:r>
-              <a:rPr lang="en-US" dirty="0" smtClean="0"/>
-              <a:t>TOTAL: ($7500.00)</a:t>
-            </a:r>
-          </a:p>
-          <a:p>
-            <a:pPr marL="349250" lvl="1" indent="0">
-              <a:buNone/>
-            </a:pPr>
             <a:endParaRPr lang="en-US" dirty="0"/>
           </a:p>
         </p:txBody>
       </p:sp>
+      <p:pic>
+        <p:nvPicPr>
+          <p:cNvPr id="6" name="Picture 5" descr="TEALS.png"/>
+          <p:cNvPicPr>
+            <a:picLocks noChangeAspect="1"/>
+          </p:cNvPicPr>
+          <p:nvPr/>
+        </p:nvPicPr>
+        <p:blipFill>
+          <a:blip r:embed="rId2">
+            <a:extLst>
+              <a:ext uri="{28A0092B-C50C-407E-A947-70E740481C1C}">
+                <a14:useLocalDpi xmlns:a14="http://schemas.microsoft.com/office/drawing/2010/main" val="0"/>
+              </a:ext>
+            </a:extLst>
+          </a:blip>
+          <a:stretch>
+            <a:fillRect/>
+          </a:stretch>
+        </p:blipFill>
+        <p:spPr>
+          <a:xfrm>
+            <a:off x="5267451" y="4710548"/>
+            <a:ext cx="3646362" cy="1555781"/>
+          </a:xfrm>
+          <a:prstGeom prst="rect">
+            <a:avLst/>
+          </a:prstGeom>
+        </p:spPr>
+      </p:pic>
     </p:spTree>
     <p:extLst>
       <p:ext uri="{BB962C8B-B14F-4D97-AF65-F5344CB8AC3E}">
-        <p14:creationId xmlns:p14="http://schemas.microsoft.com/office/powerpoint/2010/main" val="3387192578"/>
+        <p14:creationId xmlns:p14="http://schemas.microsoft.com/office/powerpoint/2010/main" val="441357212"/>
       </p:ext>
     </p:extLst>
   </p:cSld>
   <p:clrMapOvr>
     <a:masterClrMapping/>
   </p:clrMapOvr>
+  <p:timing>
+    <p:tnLst>
+      <p:par>
+        <p:cTn xmlns:p14="http://schemas.microsoft.com/office/powerpoint/2010/main" id="1" dur="indefinite" restart="never" nodeType="tmRoot"/>
+      </p:par>
+    </p:tnLst>
+  </p:timing>
 </p:sld>
 </file>
 
@@ -5251,7 +5375,7 @@
           <a:p>
             <a:r>
               <a:rPr lang="en-US" dirty="0" smtClean="0"/>
-              <a:t>Schedule</a:t>
+              <a:t>Plan</a:t>
             </a:r>
             <a:endParaRPr lang="en-US" dirty="0"/>
           </a:p>
@@ -5275,101 +5399,95 @@
           <a:lstStyle/>
           <a:p>
             <a:r>
-              <a:rPr lang="en-US" b="1" dirty="0"/>
-              <a:t>IN </a:t>
-            </a:r>
-            <a:r>
-              <a:rPr lang="en-US" b="1" dirty="0" smtClean="0"/>
-              <a:t>2017</a:t>
-            </a:r>
-          </a:p>
-          <a:p>
-            <a:r>
-              <a:rPr lang="en-US" b="1" dirty="0" smtClean="0"/>
-              <a:t>May 21-31</a:t>
-            </a:r>
-            <a:r>
-              <a:rPr lang="en-US" dirty="0" smtClean="0"/>
-              <a:t>; Work with FRSD staff on logistics</a:t>
-            </a:r>
-          </a:p>
-          <a:p>
-            <a:r>
-              <a:rPr lang="en-US" b="1" dirty="0" smtClean="0"/>
-              <a:t>June 10 </a:t>
-            </a:r>
-            <a:r>
-              <a:rPr lang="mr-IN" b="1" dirty="0" smtClean="0"/>
-              <a:t>–</a:t>
-            </a:r>
-            <a:r>
-              <a:rPr lang="en-US" b="1" dirty="0" smtClean="0"/>
-              <a:t> Sept 30</a:t>
-            </a:r>
-            <a:r>
-              <a:rPr lang="en-US" dirty="0" smtClean="0"/>
-              <a:t>: Advertise program to FRSD students and instructors/mentors at local colleges</a:t>
-            </a:r>
-          </a:p>
-          <a:p>
-            <a:r>
-              <a:rPr lang="en-US" b="1" dirty="0" smtClean="0"/>
-              <a:t>Oct 1 </a:t>
-            </a:r>
-            <a:r>
-              <a:rPr lang="mr-IN" b="1" dirty="0" smtClean="0"/>
-              <a:t>–</a:t>
-            </a:r>
-            <a:r>
-              <a:rPr lang="en-US" b="1" dirty="0" smtClean="0"/>
-              <a:t> 10</a:t>
-            </a:r>
-            <a:r>
-              <a:rPr lang="en-US" dirty="0" smtClean="0"/>
-              <a:t>: Process applicants</a:t>
-            </a:r>
-          </a:p>
-          <a:p>
-            <a:r>
-              <a:rPr lang="en-US" b="1" dirty="0" smtClean="0"/>
-              <a:t>Oct 17 </a:t>
-            </a:r>
-            <a:r>
-              <a:rPr lang="mr-IN" b="1" dirty="0" smtClean="0"/>
-              <a:t>–</a:t>
-            </a:r>
-            <a:r>
-              <a:rPr lang="en-US" b="1" dirty="0" smtClean="0"/>
-              <a:t> 25</a:t>
-            </a:r>
-            <a:r>
-              <a:rPr lang="en-US" dirty="0" smtClean="0"/>
-              <a:t>: Announcements</a:t>
-            </a:r>
-          </a:p>
-          <a:p>
-            <a:r>
-              <a:rPr lang="en-US" b="1" dirty="0" smtClean="0"/>
-              <a:t>Oct 31</a:t>
-            </a:r>
-            <a:r>
-              <a:rPr lang="en-US" dirty="0" smtClean="0"/>
-              <a:t>: Launch </a:t>
-            </a:r>
-            <a:endParaRPr lang="en-US" dirty="0"/>
+              <a:rPr lang="en-US" dirty="0" smtClean="0"/>
+              <a:t>Afterschool tutoring program for young female students at FRSD</a:t>
+            </a:r>
+          </a:p>
+          <a:p>
+            <a:r>
+              <a:rPr lang="en-US" dirty="0" smtClean="0"/>
+              <a:t>Details:</a:t>
+            </a:r>
+          </a:p>
+          <a:p>
+            <a:pPr lvl="1"/>
+            <a:r>
+              <a:rPr lang="en-US" dirty="0" smtClean="0"/>
+              <a:t>Held at Manalapan/Freehold Township High School Media </a:t>
+            </a:r>
+            <a:r>
+              <a:rPr lang="en-US" dirty="0" smtClean="0"/>
+              <a:t>Centers, and </a:t>
+            </a:r>
+            <a:r>
+              <a:rPr lang="en-US" dirty="0" err="1" smtClean="0"/>
+              <a:t>Barkalow</a:t>
+            </a:r>
+            <a:r>
+              <a:rPr lang="en-US" dirty="0" smtClean="0"/>
+              <a:t> Middle School </a:t>
+            </a:r>
+            <a:r>
+              <a:rPr lang="en-US" dirty="0" smtClean="0"/>
+              <a:t>(access to computers)</a:t>
+            </a:r>
+          </a:p>
+          <a:p>
+            <a:pPr lvl="1"/>
+            <a:r>
+              <a:rPr lang="en-US" dirty="0" smtClean="0"/>
+              <a:t>Over course of academic year, starting at the end of October</a:t>
+            </a:r>
+          </a:p>
+          <a:p>
+            <a:pPr lvl="1"/>
+            <a:r>
+              <a:rPr lang="en-US" dirty="0" smtClean="0"/>
+              <a:t>Funding provided by Google Educational Grant</a:t>
+            </a:r>
+          </a:p>
+          <a:p>
+            <a:pPr lvl="1"/>
+            <a:r>
+              <a:rPr lang="en-US" dirty="0" smtClean="0"/>
+              <a:t>Teachers provided are volunteers by Rutgers/local </a:t>
+            </a:r>
+            <a:r>
+              <a:rPr lang="en-US" dirty="0" smtClean="0"/>
+              <a:t>colleges</a:t>
+            </a:r>
+          </a:p>
+          <a:p>
+            <a:pPr lvl="1"/>
+            <a:r>
+              <a:rPr lang="en-US" dirty="0" smtClean="0"/>
+              <a:t>Costs $7500.00</a:t>
+            </a:r>
+            <a:endParaRPr lang="en-US" dirty="0" smtClean="0"/>
+          </a:p>
+          <a:p>
+            <a:pPr lvl="1"/>
+            <a:endParaRPr lang="en-US" dirty="0" smtClean="0"/>
           </a:p>
         </p:txBody>
       </p:sp>
     </p:spTree>
     <p:extLst>
       <p:ext uri="{BB962C8B-B14F-4D97-AF65-F5344CB8AC3E}">
-        <p14:creationId xmlns:p14="http://schemas.microsoft.com/office/powerpoint/2010/main" val="3971672955"/>
+        <p14:creationId xmlns:p14="http://schemas.microsoft.com/office/powerpoint/2010/main" val="3828261997"/>
       </p:ext>
     </p:extLst>
   </p:cSld>
   <p:clrMapOvr>
     <a:masterClrMapping/>
   </p:clrMapOvr>
+  <p:timing>
+    <p:tnLst>
+      <p:par>
+        <p:cTn xmlns:p14="http://schemas.microsoft.com/office/powerpoint/2010/main" id="1" dur="indefinite" restart="never" nodeType="tmRoot"/>
+      </p:par>
+    </p:tnLst>
+  </p:timing>
 </p:sld>
 </file>
 
@@ -5407,7 +5525,7 @@
           <a:p>
             <a:r>
               <a:rPr lang="en-US" dirty="0" smtClean="0"/>
-              <a:t>Impact</a:t>
+              <a:t>Schedule</a:t>
             </a:r>
             <a:endParaRPr lang="en-US" dirty="0"/>
           </a:p>
@@ -5431,93 +5549,130 @@
           <a:lstStyle/>
           <a:p>
             <a:r>
-              <a:rPr lang="en-US" dirty="0" smtClean="0"/>
-              <a:t>Revenue gain</a:t>
-            </a:r>
-          </a:p>
-          <a:p>
-            <a:pPr lvl="1"/>
-            <a:r>
-              <a:rPr lang="en-US" dirty="0"/>
-              <a:t>Donors</a:t>
-            </a:r>
-          </a:p>
-          <a:p>
-            <a:pPr lvl="1"/>
-            <a:r>
-              <a:rPr lang="en-US" dirty="0"/>
-              <a:t>Money </a:t>
-            </a:r>
-            <a:r>
-              <a:rPr lang="en-US" dirty="0" smtClean="0"/>
-              <a:t>allocation</a:t>
-            </a:r>
-          </a:p>
-          <a:p>
-            <a:r>
-              <a:rPr lang="en-US" dirty="0" smtClean="0"/>
-              <a:t>Increased motivation</a:t>
-            </a:r>
-          </a:p>
-          <a:p>
-            <a:pPr lvl="1"/>
-            <a:r>
-              <a:rPr lang="en-US" dirty="0" smtClean="0"/>
-              <a:t>Girls Who Code example</a:t>
-            </a:r>
-          </a:p>
-          <a:p>
-            <a:pPr lvl="1"/>
-            <a:r>
-              <a:rPr lang="en-US" dirty="0" smtClean="0"/>
-              <a:t>Reasons why there is more motivation</a:t>
-            </a:r>
-          </a:p>
-          <a:p>
-            <a:r>
-              <a:rPr lang="en-US" dirty="0" smtClean="0"/>
-              <a:t>Foundation for future tech programs</a:t>
-            </a:r>
-          </a:p>
-          <a:p>
-            <a:pPr lvl="1"/>
-            <a:r>
-              <a:rPr lang="en-US" dirty="0" smtClean="0"/>
-              <a:t>Grow outreach with more local colleges</a:t>
-            </a:r>
-          </a:p>
-          <a:p>
-            <a:pPr lvl="1"/>
-            <a:r>
-              <a:rPr lang="en-US" dirty="0" smtClean="0"/>
-              <a:t>Expand on district-&gt;state level-&gt;interstate level</a:t>
-            </a:r>
-          </a:p>
-          <a:p>
-            <a:r>
-              <a:rPr lang="en-US" dirty="0" smtClean="0"/>
-              <a:t>Future support</a:t>
-            </a:r>
-          </a:p>
-          <a:p>
-            <a:pPr lvl="1"/>
-            <a:r>
-              <a:rPr lang="en-US" dirty="0" smtClean="0"/>
-              <a:t>Incentive to support is more palatable</a:t>
-            </a:r>
+              <a:rPr lang="en-US" b="1" dirty="0" smtClean="0"/>
+              <a:t>Over 2017 </a:t>
+            </a:r>
+            <a:r>
+              <a:rPr lang="mr-IN" b="1" dirty="0" smtClean="0"/>
+              <a:t>–</a:t>
+            </a:r>
+            <a:r>
+              <a:rPr lang="en-US" b="1" dirty="0" smtClean="0"/>
+              <a:t> 2018 academic year; one program for middle school and one for high school</a:t>
+            </a:r>
+            <a:endParaRPr lang="en-US" b="1" dirty="0" smtClean="0"/>
+          </a:p>
+          <a:p>
+            <a:r>
+              <a:rPr lang="en-US" b="1" dirty="0" smtClean="0"/>
+              <a:t>May 21-31</a:t>
+            </a:r>
+            <a:r>
+              <a:rPr lang="en-US" dirty="0" smtClean="0"/>
+              <a:t>; Work with FRSD staff on logistics</a:t>
+            </a:r>
+          </a:p>
+          <a:p>
+            <a:r>
+              <a:rPr lang="en-US" b="1" dirty="0" smtClean="0"/>
+              <a:t>June 10 </a:t>
+            </a:r>
+            <a:r>
+              <a:rPr lang="mr-IN" b="1" dirty="0" smtClean="0"/>
+              <a:t>–</a:t>
+            </a:r>
+            <a:r>
+              <a:rPr lang="en-US" b="1" dirty="0" smtClean="0"/>
+              <a:t> Sept 30</a:t>
+            </a:r>
+            <a:r>
+              <a:rPr lang="en-US" dirty="0" smtClean="0"/>
+              <a:t>: Advertise program to FRSD students and instructors/mentors at local colleges</a:t>
+            </a:r>
+          </a:p>
+          <a:p>
+            <a:r>
+              <a:rPr lang="en-US" b="1" dirty="0" smtClean="0"/>
+              <a:t>Oct 1 </a:t>
+            </a:r>
+            <a:r>
+              <a:rPr lang="mr-IN" b="1" dirty="0" smtClean="0"/>
+              <a:t>–</a:t>
+            </a:r>
+            <a:r>
+              <a:rPr lang="en-US" b="1" dirty="0" smtClean="0"/>
+              <a:t> 10</a:t>
+            </a:r>
+            <a:r>
+              <a:rPr lang="en-US" dirty="0" smtClean="0"/>
+              <a:t>: Process applicants</a:t>
+            </a:r>
+          </a:p>
+          <a:p>
+            <a:r>
+              <a:rPr lang="en-US" b="1" dirty="0" smtClean="0"/>
+              <a:t>Oct 17 </a:t>
+            </a:r>
+            <a:r>
+              <a:rPr lang="mr-IN" b="1" dirty="0" smtClean="0"/>
+              <a:t>–</a:t>
+            </a:r>
+            <a:r>
+              <a:rPr lang="en-US" b="1" dirty="0" smtClean="0"/>
+              <a:t> 25</a:t>
+            </a:r>
+            <a:r>
+              <a:rPr lang="en-US" dirty="0" smtClean="0"/>
+              <a:t>: Announcements</a:t>
+            </a:r>
+          </a:p>
+          <a:p>
+            <a:r>
+              <a:rPr lang="en-US" b="1" dirty="0" smtClean="0"/>
+              <a:t>Oct 31</a:t>
+            </a:r>
+            <a:r>
+              <a:rPr lang="en-US" dirty="0" smtClean="0"/>
+              <a:t>: Launch </a:t>
+            </a:r>
+            <a:endParaRPr lang="en-US" dirty="0" smtClean="0"/>
+          </a:p>
+          <a:p>
+            <a:r>
+              <a:rPr lang="en-US" b="1" dirty="0" smtClean="0"/>
+              <a:t>April 30, 2018 </a:t>
+            </a:r>
+            <a:r>
+              <a:rPr lang="en-US" dirty="0" smtClean="0"/>
+              <a:t>: End </a:t>
+            </a:r>
+            <a:endParaRPr lang="en-US" dirty="0"/>
+          </a:p>
+          <a:p>
+            <a:endParaRPr lang="en-US" dirty="0" smtClean="0"/>
+          </a:p>
+          <a:p>
+            <a:endParaRPr lang="en-US" dirty="0"/>
           </a:p>
         </p:txBody>
       </p:sp>
     </p:spTree>
     <p:extLst>
       <p:ext uri="{BB962C8B-B14F-4D97-AF65-F5344CB8AC3E}">
-        <p14:creationId xmlns:p14="http://schemas.microsoft.com/office/powerpoint/2010/main" val="1845815705"/>
+        <p14:creationId xmlns:p14="http://schemas.microsoft.com/office/powerpoint/2010/main" val="3971672955"/>
       </p:ext>
     </p:extLst>
   </p:cSld>
   <p:clrMapOvr>
     <a:masterClrMapping/>
   </p:clrMapOvr>
+  <p:timing>
+    <p:tnLst>
+      <p:par>
+        <p:cTn xmlns:p14="http://schemas.microsoft.com/office/powerpoint/2010/main" id="1" dur="indefinite" restart="never" nodeType="tmRoot"/>
+      </p:par>
+    </p:tnLst>
+  </p:timing>
 </p:sld>
 </file>
 
@@ -5555,6 +5710,314 @@
           <a:p>
             <a:r>
               <a:rPr lang="en-US" dirty="0" smtClean="0"/>
+              <a:t>Budget</a:t>
+            </a:r>
+            <a:endParaRPr lang="en-US" dirty="0"/>
+          </a:p>
+        </p:txBody>
+      </p:sp>
+      <p:sp>
+        <p:nvSpPr>
+          <p:cNvPr id="3" name="Content Placeholder 2"/>
+          <p:cNvSpPr>
+            <a:spLocks noGrp="1"/>
+          </p:cNvSpPr>
+          <p:nvPr>
+            <p:ph idx="1"/>
+          </p:nvPr>
+        </p:nvSpPr>
+        <p:spPr/>
+        <p:txBody>
+          <a:bodyPr>
+            <a:normAutofit/>
+          </a:bodyPr>
+          <a:lstStyle/>
+          <a:p>
+            <a:r>
+              <a:rPr lang="en-US" dirty="0" smtClean="0"/>
+              <a:t>Laptops</a:t>
+            </a:r>
+          </a:p>
+          <a:p>
+            <a:pPr lvl="1"/>
+            <a:r>
+              <a:rPr lang="en-US" dirty="0" smtClean="0"/>
+              <a:t>Lenovo M23 </a:t>
+            </a:r>
+            <a:r>
+              <a:rPr lang="en-US" dirty="0" err="1" smtClean="0"/>
+              <a:t>Chromebook</a:t>
+            </a:r>
+            <a:r>
+              <a:rPr lang="en-US" dirty="0" smtClean="0"/>
+              <a:t> Laptops ($5370.00)</a:t>
+            </a:r>
+          </a:p>
+          <a:p>
+            <a:r>
+              <a:rPr lang="en-US" dirty="0" smtClean="0"/>
+              <a:t>Transportation</a:t>
+            </a:r>
+          </a:p>
+          <a:p>
+            <a:pPr lvl="1"/>
+            <a:r>
+              <a:rPr lang="en-US" dirty="0" smtClean="0"/>
+              <a:t>Subsidies for transportation ($1800.00)</a:t>
+            </a:r>
+          </a:p>
+          <a:p>
+            <a:r>
+              <a:rPr lang="en-US" dirty="0" smtClean="0"/>
+              <a:t>Teaching supplies ($300)</a:t>
+            </a:r>
+          </a:p>
+          <a:p>
+            <a:pPr lvl="1"/>
+            <a:r>
+              <a:rPr lang="en-US" dirty="0"/>
+              <a:t>Pens, pencils, notepads, etc.</a:t>
+            </a:r>
+          </a:p>
+          <a:p>
+            <a:pPr lvl="1"/>
+            <a:r>
+              <a:rPr lang="en-US" dirty="0"/>
+              <a:t>Whiteboards, markers, etc. </a:t>
+            </a:r>
+            <a:endParaRPr lang="en-US" dirty="0" smtClean="0"/>
+          </a:p>
+          <a:p>
+            <a:r>
+              <a:rPr lang="en-US" dirty="0" smtClean="0"/>
+              <a:t>TOTAL: ($7500.00)</a:t>
+            </a:r>
+          </a:p>
+          <a:p>
+            <a:pPr marL="349250" lvl="1" indent="0">
+              <a:buNone/>
+            </a:pPr>
+            <a:endParaRPr lang="en-US" dirty="0"/>
+          </a:p>
+        </p:txBody>
+      </p:sp>
+    </p:spTree>
+    <p:extLst>
+      <p:ext uri="{BB962C8B-B14F-4D97-AF65-F5344CB8AC3E}">
+        <p14:creationId xmlns:p14="http://schemas.microsoft.com/office/powerpoint/2010/main" val="3387192578"/>
+      </p:ext>
+    </p:extLst>
+  </p:cSld>
+  <p:clrMapOvr>
+    <a:masterClrMapping/>
+  </p:clrMapOvr>
+  <p:timing>
+    <p:tnLst>
+      <p:par>
+        <p:cTn xmlns:p14="http://schemas.microsoft.com/office/powerpoint/2010/main" id="1" dur="indefinite" restart="never" nodeType="tmRoot"/>
+      </p:par>
+    </p:tnLst>
+  </p:timing>
+</p:sld>
+</file>
+
+<file path=ppt/slides/slide14.xml><?xml version="1.0" encoding="utf-8"?>
+<p:sld xmlns:a="http://schemas.openxmlformats.org/drawingml/2006/main" xmlns:r="http://schemas.openxmlformats.org/officeDocument/2006/relationships" xmlns:p="http://schemas.openxmlformats.org/presentationml/2006/main">
+  <p:cSld>
+    <p:spTree>
+      <p:nvGrpSpPr>
+        <p:cNvPr id="1" name=""/>
+        <p:cNvGrpSpPr/>
+        <p:nvPr/>
+      </p:nvGrpSpPr>
+      <p:grpSpPr>
+        <a:xfrm>
+          <a:off x="0" y="0"/>
+          <a:ext cx="0" cy="0"/>
+          <a:chOff x="0" y="0"/>
+          <a:chExt cx="0" cy="0"/>
+        </a:xfrm>
+      </p:grpSpPr>
+      <p:sp>
+        <p:nvSpPr>
+          <p:cNvPr id="2" name="Title 1"/>
+          <p:cNvSpPr>
+            <a:spLocks noGrp="1"/>
+          </p:cNvSpPr>
+          <p:nvPr>
+            <p:ph type="title"/>
+          </p:nvPr>
+        </p:nvSpPr>
+        <p:spPr/>
+        <p:txBody>
+          <a:bodyPr/>
+          <a:lstStyle/>
+          <a:p>
+            <a:r>
+              <a:rPr lang="en-US" dirty="0" smtClean="0"/>
+              <a:t>Impact</a:t>
+            </a:r>
+            <a:endParaRPr lang="en-US" dirty="0"/>
+          </a:p>
+        </p:txBody>
+      </p:sp>
+      <p:sp>
+        <p:nvSpPr>
+          <p:cNvPr id="3" name="Content Placeholder 2"/>
+          <p:cNvSpPr>
+            <a:spLocks noGrp="1"/>
+          </p:cNvSpPr>
+          <p:nvPr>
+            <p:ph idx="1"/>
+          </p:nvPr>
+        </p:nvSpPr>
+        <p:spPr/>
+        <p:txBody>
+          <a:bodyPr>
+            <a:normAutofit fontScale="85000" lnSpcReduction="20000"/>
+          </a:bodyPr>
+          <a:lstStyle/>
+          <a:p>
+            <a:r>
+              <a:rPr lang="en-US" dirty="0" smtClean="0"/>
+              <a:t>Revenue gain</a:t>
+            </a:r>
+          </a:p>
+          <a:p>
+            <a:pPr lvl="1"/>
+            <a:r>
+              <a:rPr lang="en-US" dirty="0"/>
+              <a:t>Donors</a:t>
+            </a:r>
+          </a:p>
+          <a:p>
+            <a:pPr lvl="1"/>
+            <a:r>
+              <a:rPr lang="en-US" dirty="0"/>
+              <a:t>Money </a:t>
+            </a:r>
+            <a:r>
+              <a:rPr lang="en-US" dirty="0" smtClean="0"/>
+              <a:t>allocation</a:t>
+            </a:r>
+          </a:p>
+          <a:p>
+            <a:r>
+              <a:rPr lang="en-US" dirty="0" smtClean="0"/>
+              <a:t>Increased motivation</a:t>
+            </a:r>
+          </a:p>
+          <a:p>
+            <a:pPr lvl="1"/>
+            <a:r>
+              <a:rPr lang="en-US" dirty="0" smtClean="0"/>
+              <a:t>Girls Who </a:t>
+            </a:r>
+            <a:r>
+              <a:rPr lang="en-US" dirty="0" smtClean="0"/>
+              <a:t>Code/Microsoft TEALS </a:t>
+            </a:r>
+            <a:r>
+              <a:rPr lang="en-US" dirty="0" smtClean="0"/>
+              <a:t>example</a:t>
+            </a:r>
+          </a:p>
+          <a:p>
+            <a:pPr lvl="1"/>
+            <a:r>
+              <a:rPr lang="en-US" dirty="0" smtClean="0"/>
+              <a:t>Reasons why there is more motivation</a:t>
+            </a:r>
+          </a:p>
+          <a:p>
+            <a:r>
+              <a:rPr lang="en-US" dirty="0" smtClean="0"/>
+              <a:t>Foundation for future tech programs</a:t>
+            </a:r>
+          </a:p>
+          <a:p>
+            <a:pPr lvl="1"/>
+            <a:r>
+              <a:rPr lang="en-US" dirty="0" smtClean="0"/>
+              <a:t>Grow outreach with more local colleges</a:t>
+            </a:r>
+          </a:p>
+          <a:p>
+            <a:pPr lvl="1"/>
+            <a:r>
+              <a:rPr lang="en-US" dirty="0" smtClean="0"/>
+              <a:t>Expand on district-&gt;state level-&gt;interstate level</a:t>
+            </a:r>
+          </a:p>
+          <a:p>
+            <a:r>
+              <a:rPr lang="en-US" dirty="0" smtClean="0"/>
+              <a:t>Future support</a:t>
+            </a:r>
+          </a:p>
+          <a:p>
+            <a:pPr lvl="1"/>
+            <a:r>
+              <a:rPr lang="en-US" dirty="0" smtClean="0"/>
+              <a:t>Incentive to support is more palatable</a:t>
+            </a:r>
+          </a:p>
+        </p:txBody>
+      </p:sp>
+    </p:spTree>
+    <p:extLst>
+      <p:ext uri="{BB962C8B-B14F-4D97-AF65-F5344CB8AC3E}">
+        <p14:creationId xmlns:p14="http://schemas.microsoft.com/office/powerpoint/2010/main" val="1845815705"/>
+      </p:ext>
+    </p:extLst>
+  </p:cSld>
+  <p:clrMapOvr>
+    <a:masterClrMapping/>
+  </p:clrMapOvr>
+  <p:timing>
+    <p:tnLst>
+      <p:par>
+        <p:cTn xmlns:p14="http://schemas.microsoft.com/office/powerpoint/2010/main" id="1" dur="indefinite" restart="never" nodeType="tmRoot"/>
+      </p:par>
+    </p:tnLst>
+  </p:timing>
+</p:sld>
+</file>
+
+<file path=ppt/slides/slide15.xml><?xml version="1.0" encoding="utf-8"?>
+<p:sld xmlns:a="http://schemas.openxmlformats.org/drawingml/2006/main" xmlns:r="http://schemas.openxmlformats.org/officeDocument/2006/relationships" xmlns:p="http://schemas.openxmlformats.org/presentationml/2006/main">
+  <p:cSld>
+    <p:spTree>
+      <p:nvGrpSpPr>
+        <p:cNvPr id="1" name=""/>
+        <p:cNvGrpSpPr/>
+        <p:nvPr/>
+      </p:nvGrpSpPr>
+      <p:grpSpPr>
+        <a:xfrm>
+          <a:off x="0" y="0"/>
+          <a:ext cx="0" cy="0"/>
+          <a:chOff x="0" y="0"/>
+          <a:chExt cx="0" cy="0"/>
+        </a:xfrm>
+      </p:grpSpPr>
+      <p:sp>
+        <p:nvSpPr>
+          <p:cNvPr id="2" name="Title 1"/>
+          <p:cNvSpPr>
+            <a:spLocks noGrp="1"/>
+          </p:cNvSpPr>
+          <p:nvPr>
+            <p:ph type="title"/>
+          </p:nvPr>
+        </p:nvSpPr>
+        <p:spPr/>
+        <p:txBody>
+          <a:bodyPr/>
+          <a:lstStyle/>
+          <a:p>
+            <a:r>
+              <a:rPr lang="en-US" dirty="0" smtClean="0"/>
               <a:t>Discussion</a:t>
             </a:r>
             <a:endParaRPr lang="en-US" dirty="0"/>
@@ -5573,29 +6036,60 @@
         </p:nvSpPr>
         <p:spPr/>
         <p:txBody>
-          <a:bodyPr/>
-          <a:lstStyle/>
-          <a:p>
-            <a:r>
-              <a:rPr lang="en-US" dirty="0" smtClean="0"/>
-              <a:t>What do you think of the budget?</a:t>
-            </a:r>
-          </a:p>
-          <a:p>
-            <a:r>
-              <a:rPr lang="en-US" dirty="0" smtClean="0"/>
-              <a:t>What do you think of the motivation/reasons to fight at the middle/high school level?</a:t>
-            </a:r>
-          </a:p>
-          <a:p>
-            <a:r>
-              <a:rPr lang="en-US" dirty="0" smtClean="0"/>
-              <a:t>Do you have any suggestions </a:t>
-            </a:r>
-            <a:r>
-              <a:rPr lang="en-US" smtClean="0"/>
-              <a:t>for improvement?</a:t>
-            </a:r>
+          <a:bodyPr>
+            <a:normAutofit fontScale="92500" lnSpcReduction="10000"/>
+          </a:bodyPr>
+          <a:lstStyle/>
+          <a:p>
+            <a:r>
+              <a:rPr lang="en-US" dirty="0" smtClean="0"/>
+              <a:t>Can measure success by simple surveys:</a:t>
+            </a:r>
+          </a:p>
+          <a:p>
+            <a:pPr lvl="1"/>
+            <a:r>
+              <a:rPr lang="en-US" dirty="0" smtClean="0"/>
+              <a:t>Emails surveys once a month</a:t>
+            </a:r>
+          </a:p>
+          <a:p>
+            <a:pPr lvl="1"/>
+            <a:r>
+              <a:rPr lang="en-US" dirty="0" smtClean="0"/>
+              <a:t>In-class surveys at least twice a month</a:t>
+            </a:r>
+          </a:p>
+          <a:p>
+            <a:r>
+              <a:rPr lang="en-US" dirty="0" smtClean="0"/>
+              <a:t>Young women in the FRSD benefit in three ways:</a:t>
+            </a:r>
+          </a:p>
+          <a:p>
+            <a:pPr lvl="1"/>
+            <a:r>
+              <a:rPr lang="en-US" dirty="0" smtClean="0"/>
+              <a:t>Role model exposure, access to computer science educational resources, and opportunities for interacting with their peers</a:t>
+            </a:r>
+            <a:endParaRPr lang="en-US" dirty="0" smtClean="0"/>
+          </a:p>
+          <a:p>
+            <a:r>
+              <a:rPr lang="en-US" dirty="0" smtClean="0"/>
+              <a:t>Want </a:t>
+            </a:r>
+            <a:r>
+              <a:rPr lang="en-US" dirty="0" smtClean="0"/>
+              <a:t>to see a 30% improvement in the number of women who are interested in computer science within 1 year </a:t>
+            </a:r>
+          </a:p>
+          <a:p>
+            <a:r>
+              <a:rPr lang="en-US" dirty="0" smtClean="0"/>
+              <a:t>Want to expand the program to other districts and schools within 5 years</a:t>
+            </a:r>
+            <a:endParaRPr lang="en-US" dirty="0" smtClean="0"/>
           </a:p>
         </p:txBody>
       </p:sp>
@@ -5609,10 +6103,17 @@
   <p:clrMapOvr>
     <a:masterClrMapping/>
   </p:clrMapOvr>
+  <p:timing>
+    <p:tnLst>
+      <p:par>
+        <p:cTn xmlns:p14="http://schemas.microsoft.com/office/powerpoint/2010/main" id="1" dur="indefinite" restart="never" nodeType="tmRoot"/>
+      </p:par>
+    </p:tnLst>
+  </p:timing>
 </p:sld>
 </file>
 
-<file path=ppt/slides/slide14.xml><?xml version="1.0" encoding="utf-8"?>
+<file path=ppt/slides/slide16.xml><?xml version="1.0" encoding="utf-8"?>
 <p:sld xmlns:a="http://schemas.openxmlformats.org/drawingml/2006/main" xmlns:r="http://schemas.openxmlformats.org/officeDocument/2006/relationships" xmlns:p="http://schemas.openxmlformats.org/presentationml/2006/main">
   <p:cSld>
     <p:spTree>
@@ -5750,7 +6251,7 @@
           <a:p>
             <a:r>
               <a:rPr lang="en-US" dirty="0" smtClean="0"/>
-              <a:t>Problem</a:t>
+              <a:t>Industry-Level Problems</a:t>
             </a:r>
             <a:endParaRPr lang="en-US" dirty="0"/>
           </a:p>
@@ -5768,63 +6269,139 @@
         </p:nvSpPr>
         <p:spPr/>
         <p:txBody>
-          <a:bodyPr/>
-          <a:lstStyle/>
-          <a:p>
-            <a:r>
-              <a:rPr lang="en-US" dirty="0" smtClean="0"/>
-              <a:t>Statistics</a:t>
-            </a:r>
-          </a:p>
-          <a:p>
-            <a:pPr lvl="1"/>
-            <a:r>
-              <a:rPr lang="en-US" dirty="0" smtClean="0"/>
-              <a:t>US EEOC</a:t>
-            </a:r>
-          </a:p>
-          <a:p>
-            <a:pPr lvl="1"/>
-            <a:r>
-              <a:rPr lang="en-US" dirty="0" smtClean="0"/>
-              <a:t>Sarah</a:t>
-            </a:r>
-            <a:r>
-              <a:rPr lang="en-US" dirty="0"/>
-              <a:t>-Jane Leslie</a:t>
-            </a:r>
-          </a:p>
-          <a:p>
-            <a:pPr lvl="1"/>
-            <a:r>
-              <a:rPr lang="en-US" dirty="0"/>
-              <a:t>Rosemary </a:t>
-            </a:r>
-            <a:r>
-              <a:rPr lang="en-US" dirty="0" err="1" smtClean="0"/>
-              <a:t>Edzie</a:t>
-            </a:r>
+          <a:bodyPr>
+            <a:normAutofit/>
+          </a:bodyPr>
+          <a:lstStyle/>
+          <a:p>
+            <a:r>
+              <a:rPr lang="en-US" b="1" u="sng" dirty="0" smtClean="0"/>
+              <a:t>Only 18% of graduates into the tech industry are women </a:t>
+            </a:r>
+            <a:r>
+              <a:rPr lang="en-US" dirty="0" smtClean="0"/>
+              <a:t>(National Center for Women in Information Technology, 2012, p. 16)</a:t>
+            </a:r>
+            <a:endParaRPr lang="en-US" dirty="0"/>
+          </a:p>
+          <a:p>
+            <a:r>
+              <a:rPr lang="en-US" b="1" u="sng" dirty="0" smtClean="0"/>
+              <a:t>The number of female computer science majors fell by 43% </a:t>
+            </a:r>
+            <a:r>
+              <a:rPr lang="en-US" b="1" u="sng" dirty="0" smtClean="0"/>
+              <a:t>from 2005-2007 </a:t>
+            </a:r>
+            <a:r>
+              <a:rPr lang="en-US" dirty="0" smtClean="0"/>
+              <a:t>(</a:t>
+            </a:r>
+            <a:r>
+              <a:rPr lang="it-IT" dirty="0"/>
+              <a:t>Hossain &amp; Robinson, 2012, p. </a:t>
+            </a:r>
+            <a:r>
+              <a:rPr lang="it-IT" dirty="0" smtClean="0"/>
+              <a:t>444</a:t>
+            </a:r>
+            <a:r>
+              <a:rPr lang="en-US" dirty="0" smtClean="0"/>
+              <a:t>)</a:t>
+            </a:r>
+            <a:endParaRPr lang="en-US" dirty="0"/>
+          </a:p>
+          <a:p>
+            <a:r>
+              <a:rPr lang="en-US" b="1" u="sng" dirty="0" smtClean="0"/>
+              <a:t>74% of high school girls are interested in computer Science</a:t>
+            </a:r>
+            <a:r>
+              <a:rPr lang="en-US" dirty="0" smtClean="0"/>
+              <a:t> (</a:t>
+            </a:r>
+            <a:r>
+              <a:rPr lang="nb-NO" dirty="0" smtClean="0"/>
+              <a:t>Modi </a:t>
+            </a:r>
+            <a:r>
+              <a:rPr lang="nb-NO" dirty="0"/>
+              <a:t>et. al, 2012, p. 2) </a:t>
+            </a:r>
+            <a:endParaRPr lang="nb-NO" dirty="0" smtClean="0"/>
+          </a:p>
+          <a:p>
+            <a:r>
+              <a:rPr lang="nb-NO" dirty="0" smtClean="0"/>
+              <a:t>Susan Fowler, a </a:t>
+            </a:r>
+            <a:r>
+              <a:rPr lang="nb-NO" dirty="0" err="1" smtClean="0"/>
+              <a:t>high-profile</a:t>
+            </a:r>
+            <a:r>
+              <a:rPr lang="nb-NO" dirty="0" smtClean="0"/>
+              <a:t> ex-</a:t>
+            </a:r>
+            <a:r>
+              <a:rPr lang="nb-NO" dirty="0" err="1" smtClean="0"/>
+              <a:t>Uber</a:t>
+            </a:r>
+            <a:r>
+              <a:rPr lang="nb-NO" dirty="0" smtClean="0"/>
+              <a:t> </a:t>
+            </a:r>
+            <a:r>
+              <a:rPr lang="nb-NO" dirty="0" err="1" smtClean="0"/>
+              <a:t>employee</a:t>
+            </a:r>
+            <a:r>
+              <a:rPr lang="nb-NO" dirty="0" smtClean="0"/>
+              <a:t>, </a:t>
+            </a:r>
+            <a:r>
+              <a:rPr lang="nb-NO" dirty="0" err="1" smtClean="0"/>
+              <a:t>details</a:t>
+            </a:r>
+            <a:r>
+              <a:rPr lang="nb-NO" dirty="0" smtClean="0"/>
+              <a:t> an </a:t>
+            </a:r>
+            <a:r>
+              <a:rPr lang="nb-NO" dirty="0" err="1" smtClean="0"/>
+              <a:t>industry-wide</a:t>
+            </a:r>
+            <a:r>
+              <a:rPr lang="nb-NO" dirty="0" smtClean="0"/>
+              <a:t> problem </a:t>
+            </a:r>
+            <a:r>
+              <a:rPr lang="nb-NO" dirty="0" err="1" smtClean="0"/>
+              <a:t>of</a:t>
+            </a:r>
+            <a:r>
+              <a:rPr lang="nb-NO" dirty="0" smtClean="0"/>
+              <a:t> </a:t>
+            </a:r>
+            <a:r>
+              <a:rPr lang="nb-NO" dirty="0" err="1" smtClean="0"/>
+              <a:t>sexual</a:t>
+            </a:r>
+            <a:r>
+              <a:rPr lang="nb-NO" dirty="0"/>
+              <a:t> </a:t>
+            </a:r>
+            <a:r>
+              <a:rPr lang="nb-NO" dirty="0" err="1" smtClean="0"/>
+              <a:t>harassment</a:t>
+            </a:r>
+            <a:endParaRPr lang="nb-NO" dirty="0"/>
+          </a:p>
+          <a:p>
+            <a:endParaRPr lang="nb-NO" dirty="0"/>
+          </a:p>
+          <a:p>
             <a:endParaRPr lang="en-US" dirty="0" smtClean="0"/>
-          </a:p>
-          <a:p>
-            <a:r>
-              <a:rPr lang="en-US" dirty="0" smtClean="0"/>
-              <a:t>Reasons why it’s bad</a:t>
-            </a:r>
-          </a:p>
-          <a:p>
-            <a:pPr lvl="1"/>
-            <a:r>
-              <a:rPr lang="en-US" dirty="0" smtClean="0"/>
-              <a:t>Gender gaps are bad and systemically harm women/minorities</a:t>
-            </a:r>
-          </a:p>
-          <a:p>
-            <a:pPr lvl="1"/>
-            <a:r>
-              <a:rPr lang="en-US" dirty="0" smtClean="0"/>
-              <a:t>Need women to fill jobs</a:t>
-            </a:r>
           </a:p>
           <a:p>
             <a:pPr marL="685800" lvl="2" indent="0">
@@ -5844,6 +6421,13 @@
   <p:clrMapOvr>
     <a:masterClrMapping/>
   </p:clrMapOvr>
+  <p:timing>
+    <p:tnLst>
+      <p:par>
+        <p:cTn xmlns:p14="http://schemas.microsoft.com/office/powerpoint/2010/main" id="1" dur="indefinite" restart="never" nodeType="tmRoot"/>
+      </p:par>
+    </p:tnLst>
+  </p:timing>
 </p:sld>
 </file>
 
@@ -5897,7 +6481,7 @@
             <p:ph idx="1"/>
           </p:nvPr>
         </p:nvPicPr>
-        <p:blipFill>
+        <p:blipFill rotWithShape="1">
           <a:blip r:embed="rId2">
             <a:extLst>
               <a:ext uri="{28A0092B-C50C-407E-A947-70E740481C1C}">
@@ -5905,15 +6489,13 @@
               </a:ext>
             </a:extLst>
           </a:blip>
-          <a:srcRect t="7054" b="7054"/>
-          <a:stretch>
-            <a:fillRect/>
-          </a:stretch>
+          <a:srcRect t="811" b="-600"/>
+          <a:stretch/>
         </p:blipFill>
         <p:spPr>
           <a:xfrm>
-            <a:off x="834772" y="2304291"/>
-            <a:ext cx="7610476" cy="3670767"/>
+            <a:off x="835025" y="2179356"/>
+            <a:ext cx="7610475" cy="4264166"/>
           </a:xfrm>
         </p:spPr>
       </p:pic>
@@ -5927,6 +6509,13 @@
   <p:clrMapOvr>
     <a:masterClrMapping/>
   </p:clrMapOvr>
+  <p:timing>
+    <p:tnLst>
+      <p:par>
+        <p:cTn xmlns:p14="http://schemas.microsoft.com/office/powerpoint/2010/main" id="1" dur="indefinite" restart="never" nodeType="tmRoot"/>
+      </p:par>
+    </p:tnLst>
+  </p:timing>
 </p:sld>
 </file>
 
@@ -5964,7 +6553,7 @@
           <a:p>
             <a:r>
               <a:rPr lang="en-US" dirty="0" smtClean="0"/>
-              <a:t>Population</a:t>
+              <a:t>Problems at the local level</a:t>
             </a:r>
             <a:endParaRPr lang="en-US" dirty="0"/>
           </a:p>
@@ -5982,25 +6571,245 @@
         </p:nvSpPr>
         <p:spPr/>
         <p:txBody>
-          <a:bodyPr/>
-          <a:lstStyle/>
-          <a:p>
-            <a:r>
-              <a:rPr lang="en-US" dirty="0" smtClean="0"/>
-              <a:t>FRSD stats</a:t>
-            </a:r>
-          </a:p>
-          <a:p>
-            <a:r>
-              <a:rPr lang="en-US" dirty="0" smtClean="0"/>
-              <a:t>Access to CS courses </a:t>
-            </a:r>
-          </a:p>
-          <a:p>
-            <a:r>
-              <a:rPr lang="en-US" dirty="0" smtClean="0"/>
-              <a:t>Interest in CS as a career</a:t>
-            </a:r>
+          <a:bodyPr>
+            <a:normAutofit fontScale="92500" lnSpcReduction="10000"/>
+          </a:bodyPr>
+          <a:lstStyle/>
+          <a:p>
+            <a:r>
+              <a:rPr lang="nb-NO" b="1" u="sng" dirty="0"/>
+              <a:t>In FRSD, </a:t>
+            </a:r>
+            <a:r>
+              <a:rPr lang="nb-NO" b="1" u="sng" dirty="0" err="1"/>
+              <a:t>only</a:t>
+            </a:r>
+            <a:r>
+              <a:rPr lang="nb-NO" b="1" u="sng" dirty="0"/>
+              <a:t> </a:t>
+            </a:r>
+            <a:r>
+              <a:rPr lang="nb-NO" b="1" u="sng" dirty="0" smtClean="0"/>
+              <a:t>350 </a:t>
+            </a:r>
+            <a:r>
+              <a:rPr lang="nb-NO" b="1" u="sng" dirty="0" err="1" smtClean="0"/>
+              <a:t>women</a:t>
+            </a:r>
+            <a:r>
+              <a:rPr lang="nb-NO" b="1" u="sng" dirty="0" smtClean="0"/>
+              <a:t> </a:t>
+            </a:r>
+            <a:r>
+              <a:rPr lang="nb-NO" b="1" u="sng" dirty="0" err="1"/>
+              <a:t>out</a:t>
+            </a:r>
+            <a:r>
+              <a:rPr lang="nb-NO" b="1" u="sng" dirty="0"/>
+              <a:t> </a:t>
+            </a:r>
+            <a:r>
+              <a:rPr lang="nb-NO" b="1" u="sng" dirty="0" err="1"/>
+              <a:t>of</a:t>
+            </a:r>
+            <a:r>
+              <a:rPr lang="nb-NO" b="1" u="sng" dirty="0"/>
+              <a:t> 6000 </a:t>
+            </a:r>
+            <a:r>
+              <a:rPr lang="nb-NO" b="1" u="sng" dirty="0" err="1" smtClean="0"/>
+              <a:t>surveyed</a:t>
+            </a:r>
+            <a:r>
+              <a:rPr lang="nb-NO" b="1" u="sng" dirty="0" smtClean="0"/>
+              <a:t> </a:t>
+            </a:r>
+            <a:r>
+              <a:rPr lang="nb-NO" b="1" u="sng" dirty="0" err="1" smtClean="0"/>
+              <a:t>female</a:t>
+            </a:r>
+            <a:r>
+              <a:rPr lang="nb-NO" b="1" u="sng" dirty="0" smtClean="0"/>
+              <a:t> </a:t>
+            </a:r>
+            <a:r>
+              <a:rPr lang="nb-NO" b="1" u="sng" dirty="0"/>
+              <a:t>students </a:t>
+            </a:r>
+            <a:r>
+              <a:rPr lang="nb-NO" b="1" u="sng" dirty="0" err="1"/>
+              <a:t>had</a:t>
+            </a:r>
+            <a:r>
+              <a:rPr lang="nb-NO" b="1" u="sng" dirty="0"/>
+              <a:t> </a:t>
+            </a:r>
+            <a:r>
+              <a:rPr lang="nb-NO" b="1" u="sng" dirty="0" err="1"/>
+              <a:t>any</a:t>
+            </a:r>
+            <a:r>
+              <a:rPr lang="nb-NO" b="1" u="sng" dirty="0"/>
+              <a:t> </a:t>
+            </a:r>
+            <a:r>
+              <a:rPr lang="nb-NO" b="1" u="sng" dirty="0" err="1"/>
+              <a:t>interest</a:t>
+            </a:r>
+            <a:r>
+              <a:rPr lang="nb-NO" b="1" u="sng" dirty="0"/>
+              <a:t> in </a:t>
+            </a:r>
+            <a:r>
+              <a:rPr lang="nb-NO" b="1" u="sng" dirty="0" err="1"/>
+              <a:t>purusing</a:t>
+            </a:r>
+            <a:r>
+              <a:rPr lang="nb-NO" b="1" u="sng" dirty="0"/>
+              <a:t> </a:t>
+            </a:r>
+            <a:r>
+              <a:rPr lang="nb-NO" b="1" u="sng" dirty="0" err="1"/>
+              <a:t>tech</a:t>
+            </a:r>
+            <a:r>
+              <a:rPr lang="nb-NO" b="1" u="sng" dirty="0"/>
+              <a:t> </a:t>
+            </a:r>
+            <a:r>
+              <a:rPr lang="nb-NO" b="1" u="sng" dirty="0" err="1"/>
+              <a:t>after</a:t>
+            </a:r>
+            <a:r>
+              <a:rPr lang="nb-NO" b="1" u="sng" dirty="0"/>
+              <a:t> </a:t>
+            </a:r>
+            <a:r>
+              <a:rPr lang="nb-NO" b="1" u="sng" dirty="0" err="1"/>
+              <a:t>graduation</a:t>
+            </a:r>
+            <a:r>
+              <a:rPr lang="nb-NO" b="1" u="sng" dirty="0"/>
+              <a:t> </a:t>
+            </a:r>
+            <a:r>
+              <a:rPr lang="nb-NO" dirty="0"/>
+              <a:t>(</a:t>
+            </a:r>
+            <a:r>
+              <a:rPr lang="nb-NO" dirty="0" err="1"/>
+              <a:t>Freehold</a:t>
+            </a:r>
+            <a:r>
+              <a:rPr lang="nb-NO" dirty="0"/>
+              <a:t> Regional High School District, 2016, p. 4</a:t>
+            </a:r>
+            <a:r>
+              <a:rPr lang="nb-NO" dirty="0" smtClean="0"/>
+              <a:t>). </a:t>
+            </a:r>
+          </a:p>
+          <a:p>
+            <a:pPr lvl="1"/>
+            <a:r>
+              <a:rPr lang="nb-NO" dirty="0" smtClean="0"/>
+              <a:t>This is </a:t>
+            </a:r>
+            <a:r>
+              <a:rPr lang="nb-NO" dirty="0" err="1" smtClean="0"/>
+              <a:t>below</a:t>
+            </a:r>
+            <a:r>
+              <a:rPr lang="nb-NO" dirty="0" smtClean="0"/>
+              <a:t> </a:t>
+            </a:r>
+            <a:r>
+              <a:rPr lang="nb-NO" dirty="0" err="1" smtClean="0"/>
+              <a:t>the</a:t>
+            </a:r>
+            <a:r>
+              <a:rPr lang="nb-NO" dirty="0" smtClean="0"/>
+              <a:t> </a:t>
+            </a:r>
+            <a:r>
+              <a:rPr lang="nb-NO" dirty="0" err="1" smtClean="0"/>
+              <a:t>national</a:t>
+            </a:r>
+            <a:r>
+              <a:rPr lang="nb-NO" dirty="0" smtClean="0"/>
+              <a:t> </a:t>
+            </a:r>
+            <a:r>
+              <a:rPr lang="nb-NO" dirty="0" err="1" smtClean="0"/>
+              <a:t>average</a:t>
+            </a:r>
+            <a:endParaRPr lang="en-US" dirty="0" smtClean="0"/>
+          </a:p>
+          <a:p>
+            <a:r>
+              <a:rPr lang="en-US" dirty="0" smtClean="0"/>
+              <a:t>Gender </a:t>
+            </a:r>
+            <a:r>
+              <a:rPr lang="en-US" dirty="0"/>
+              <a:t>gaps are bad and systemically harm </a:t>
+            </a:r>
+            <a:r>
+              <a:rPr lang="en-US" dirty="0" smtClean="0"/>
+              <a:t>women </a:t>
+            </a:r>
+            <a:r>
+              <a:rPr lang="mr-IN" dirty="0" smtClean="0"/>
+              <a:t>–</a:t>
+            </a:r>
+            <a:r>
+              <a:rPr lang="en-US" dirty="0" smtClean="0"/>
+              <a:t> less access to opportunity</a:t>
+            </a:r>
+          </a:p>
+          <a:p>
+            <a:r>
+              <a:rPr lang="en-US" dirty="0" smtClean="0"/>
+              <a:t>Need </a:t>
+            </a:r>
+            <a:r>
+              <a:rPr lang="en-US" dirty="0"/>
+              <a:t>women to fill </a:t>
+            </a:r>
+            <a:r>
+              <a:rPr lang="en-US" dirty="0" smtClean="0"/>
+              <a:t>jobs: </a:t>
+            </a:r>
+          </a:p>
+          <a:p>
+            <a:pPr lvl="1"/>
+            <a:r>
+              <a:rPr lang="en-US" dirty="0" smtClean="0"/>
+              <a:t>At current graduation rates, US tech grads can only fill 30% of computing jobs by 2020 </a:t>
+            </a:r>
+            <a:r>
+              <a:rPr lang="en-US" dirty="0"/>
+              <a:t>(National Center for Women in Information Technology, 2012</a:t>
+            </a:r>
+            <a:r>
+              <a:rPr lang="en-US" dirty="0" smtClean="0"/>
+              <a:t>)</a:t>
+            </a:r>
+          </a:p>
+          <a:p>
+            <a:pPr lvl="1"/>
+            <a:r>
+              <a:rPr lang="en-US" dirty="0" smtClean="0"/>
+              <a:t>Women remain a huge, untapped resource for the industry</a:t>
+            </a:r>
+          </a:p>
+          <a:p>
+            <a:pPr marL="349250" lvl="1" indent="0">
+              <a:buNone/>
+            </a:pPr>
+            <a:endParaRPr lang="en-US" dirty="0"/>
+          </a:p>
+          <a:p>
             <a:endParaRPr lang="en-US" dirty="0"/>
           </a:p>
         </p:txBody>
@@ -6008,13 +6817,20 @@
     </p:spTree>
     <p:extLst>
       <p:ext uri="{BB962C8B-B14F-4D97-AF65-F5344CB8AC3E}">
-        <p14:creationId xmlns:p14="http://schemas.microsoft.com/office/powerpoint/2010/main" val="465676605"/>
+        <p14:creationId xmlns:p14="http://schemas.microsoft.com/office/powerpoint/2010/main" val="708109721"/>
       </p:ext>
     </p:extLst>
   </p:cSld>
   <p:clrMapOvr>
     <a:masterClrMapping/>
   </p:clrMapOvr>
+  <p:timing>
+    <p:tnLst>
+      <p:par>
+        <p:cTn xmlns:p14="http://schemas.microsoft.com/office/powerpoint/2010/main" id="1" dur="indefinite" restart="never" nodeType="tmRoot"/>
+      </p:par>
+    </p:tnLst>
+  </p:timing>
 </p:sld>
 </file>
 
@@ -6052,7 +6868,7 @@
           <a:p>
             <a:r>
               <a:rPr lang="en-US" dirty="0" smtClean="0"/>
-              <a:t>Paradigm 1</a:t>
+              <a:t>Causes of the problem at FRSD</a:t>
             </a:r>
             <a:endParaRPr lang="en-US" dirty="0"/>
           </a:p>
@@ -6074,23 +6890,117 @@
           <a:lstStyle/>
           <a:p>
             <a:r>
-              <a:rPr lang="en-US" dirty="0"/>
-              <a:t>Sarah-Jane </a:t>
-            </a:r>
-            <a:r>
-              <a:rPr lang="en-US" dirty="0" smtClean="0"/>
-              <a:t>Leslie </a:t>
-            </a:r>
-          </a:p>
-          <a:p>
-            <a:pPr lvl="1"/>
-            <a:r>
-              <a:rPr lang="en-US" dirty="0"/>
-              <a:t>P</a:t>
-            </a:r>
-            <a:r>
-              <a:rPr lang="en-US" dirty="0" smtClean="0"/>
-              <a:t>rofessor </a:t>
+              <a:rPr lang="en-US" dirty="0" smtClean="0"/>
+              <a:t>Access to computer science </a:t>
+            </a:r>
+            <a:r>
+              <a:rPr lang="en-US" dirty="0" smtClean="0"/>
+              <a:t>courses </a:t>
+            </a:r>
+          </a:p>
+          <a:p>
+            <a:r>
+              <a:rPr lang="en-US" dirty="0" smtClean="0"/>
+              <a:t>Teachers’ are not aware or aren’t trained in computer science</a:t>
+            </a:r>
+          </a:p>
+          <a:p>
+            <a:r>
+              <a:rPr lang="en-US" dirty="0" smtClean="0"/>
+              <a:t>No administrator knowledge on how to solve the problem</a:t>
+            </a:r>
+          </a:p>
+          <a:p>
+            <a:r>
+              <a:rPr lang="en-US" dirty="0" smtClean="0"/>
+              <a:t>Unaware of example models such as Girls Who Code or Microsoft TEALS</a:t>
+            </a:r>
+            <a:endParaRPr lang="en-US" dirty="0"/>
+          </a:p>
+        </p:txBody>
+      </p:sp>
+    </p:spTree>
+    <p:extLst>
+      <p:ext uri="{BB962C8B-B14F-4D97-AF65-F5344CB8AC3E}">
+        <p14:creationId xmlns:p14="http://schemas.microsoft.com/office/powerpoint/2010/main" val="465676605"/>
+      </p:ext>
+    </p:extLst>
+  </p:cSld>
+  <p:clrMapOvr>
+    <a:masterClrMapping/>
+  </p:clrMapOvr>
+  <p:timing>
+    <p:tnLst>
+      <p:par>
+        <p:cTn xmlns:p14="http://schemas.microsoft.com/office/powerpoint/2010/main" id="1" dur="indefinite" restart="never" nodeType="tmRoot"/>
+      </p:par>
+    </p:tnLst>
+  </p:timing>
+</p:sld>
+</file>
+
+<file path=ppt/slides/slide6.xml><?xml version="1.0" encoding="utf-8"?>
+<p:sld xmlns:a="http://schemas.openxmlformats.org/drawingml/2006/main" xmlns:r="http://schemas.openxmlformats.org/officeDocument/2006/relationships" xmlns:p="http://schemas.openxmlformats.org/presentationml/2006/main">
+  <p:cSld>
+    <p:spTree>
+      <p:nvGrpSpPr>
+        <p:cNvPr id="1" name=""/>
+        <p:cNvGrpSpPr/>
+        <p:nvPr/>
+      </p:nvGrpSpPr>
+      <p:grpSpPr>
+        <a:xfrm>
+          <a:off x="0" y="0"/>
+          <a:ext cx="0" cy="0"/>
+          <a:chOff x="0" y="0"/>
+          <a:chExt cx="0" cy="0"/>
+        </a:xfrm>
+      </p:grpSpPr>
+      <p:sp>
+        <p:nvSpPr>
+          <p:cNvPr id="2" name="Title 1"/>
+          <p:cNvSpPr>
+            <a:spLocks noGrp="1"/>
+          </p:cNvSpPr>
+          <p:nvPr>
+            <p:ph type="title"/>
+          </p:nvPr>
+        </p:nvSpPr>
+        <p:spPr/>
+        <p:txBody>
+          <a:bodyPr/>
+          <a:lstStyle/>
+          <a:p>
+            <a:r>
+              <a:rPr lang="en-US" dirty="0" smtClean="0"/>
+              <a:t>Researcher: Sarah-Jane </a:t>
+            </a:r>
+            <a:r>
+              <a:rPr lang="en-US" dirty="0" err="1" smtClean="0"/>
+              <a:t>leslie</a:t>
+            </a:r>
+            <a:endParaRPr lang="en-US" dirty="0"/>
+          </a:p>
+        </p:txBody>
+      </p:sp>
+      <p:sp>
+        <p:nvSpPr>
+          <p:cNvPr id="3" name="Content Placeholder 2"/>
+          <p:cNvSpPr>
+            <a:spLocks noGrp="1"/>
+          </p:cNvSpPr>
+          <p:nvPr>
+            <p:ph idx="1"/>
+          </p:nvPr>
+        </p:nvSpPr>
+        <p:spPr/>
+        <p:txBody>
+          <a:bodyPr/>
+          <a:lstStyle/>
+          <a:p>
+            <a:r>
+              <a:rPr lang="en-US" dirty="0" smtClean="0"/>
+              <a:t>Professor </a:t>
             </a:r>
             <a:r>
               <a:rPr lang="en-US" dirty="0"/>
@@ -6113,8 +7023,59 @@
             <a:pPr lvl="1"/>
             <a:r>
               <a:rPr lang="en-US" dirty="0" smtClean="0"/>
-              <a:t>Confidence gap</a:t>
-            </a:r>
+              <a:t>Meta-study on women in STEM fields, encompasses tech</a:t>
+            </a:r>
+            <a:endParaRPr lang="en-US" dirty="0" smtClean="0"/>
+          </a:p>
+          <a:p>
+            <a:pPr lvl="1"/>
+            <a:r>
+              <a:rPr lang="en-US" dirty="0"/>
+              <a:t>Groundbreaking research into </a:t>
+            </a:r>
+            <a:endParaRPr lang="en-US" dirty="0" smtClean="0"/>
+          </a:p>
+          <a:p>
+            <a:pPr marL="685800" lvl="2" indent="0">
+              <a:buNone/>
+            </a:pPr>
+            <a:r>
+              <a:rPr lang="en-US" dirty="0" smtClean="0"/>
+              <a:t>confidence gap</a:t>
+            </a:r>
+            <a:endParaRPr lang="en-US" dirty="0" smtClean="0"/>
+          </a:p>
+          <a:p>
+            <a:pPr lvl="1"/>
+            <a:r>
+              <a:rPr lang="en-US" dirty="0" smtClean="0"/>
+              <a:t>Consistent across diverse backgrounds, </a:t>
+            </a:r>
+          </a:p>
+          <a:p>
+            <a:pPr marL="349250" lvl="1" indent="0">
+              <a:buNone/>
+            </a:pPr>
+            <a:r>
+              <a:rPr lang="en-US" dirty="0"/>
+              <a:t> </a:t>
+            </a:r>
+            <a:r>
+              <a:rPr lang="en-US" dirty="0" smtClean="0"/>
+              <a:t>     income levels, etc.</a:t>
+            </a:r>
+          </a:p>
+          <a:p>
+            <a:pPr marL="349250" lvl="1" indent="0">
+              <a:buNone/>
+            </a:pPr>
+            <a:endParaRPr lang="en-US" dirty="0" smtClean="0"/>
+          </a:p>
+          <a:p>
+            <a:pPr marL="349250" lvl="1" indent="0">
+              <a:buNone/>
+            </a:pPr>
+            <a:endParaRPr lang="en-US" dirty="0" smtClean="0"/>
           </a:p>
           <a:p>
             <a:pPr marL="0" indent="0">
@@ -6146,7 +7107,7 @@
         </p:blipFill>
         <p:spPr>
           <a:xfrm>
-            <a:off x="3303152" y="3790043"/>
+            <a:off x="6438900" y="3876697"/>
             <a:ext cx="2286000" cy="2389632"/>
           </a:xfrm>
           <a:prstGeom prst="rect">
@@ -6164,10 +7125,17 @@
   <p:clrMapOvr>
     <a:masterClrMapping/>
   </p:clrMapOvr>
+  <p:timing>
+    <p:tnLst>
+      <p:par>
+        <p:cTn xmlns:p14="http://schemas.microsoft.com/office/powerpoint/2010/main" id="1" dur="indefinite" restart="never" nodeType="tmRoot"/>
+      </p:par>
+    </p:tnLst>
+  </p:timing>
 </p:sld>
 </file>
 
-<file path=ppt/slides/slide6.xml><?xml version="1.0" encoding="utf-8"?>
+<file path=ppt/slides/slide7.xml><?xml version="1.0" encoding="utf-8"?>
 <p:sld xmlns:a="http://schemas.openxmlformats.org/drawingml/2006/main" xmlns:r="http://schemas.openxmlformats.org/officeDocument/2006/relationships" xmlns:p="http://schemas.openxmlformats.org/presentationml/2006/main">
   <p:cSld>
     <p:spTree>
@@ -6201,7 +7169,11 @@
           <a:p>
             <a:r>
               <a:rPr lang="en-US" dirty="0" smtClean="0"/>
-              <a:t>Paradigm 2</a:t>
+              <a:t>Researcher: Rosemary L. </a:t>
+            </a:r>
+            <a:r>
+              <a:rPr lang="en-US" dirty="0" err="1" smtClean="0"/>
+              <a:t>Edzie</a:t>
             </a:r>
             <a:endParaRPr lang="en-US" dirty="0"/>
           </a:p>
@@ -6222,22 +7194,6 @@
           <a:bodyPr/>
           <a:lstStyle/>
           <a:p>
-            <a:r>
-              <a:rPr lang="en-US" dirty="0"/>
-              <a:t>Rosemary L. </a:t>
-            </a:r>
-            <a:r>
-              <a:rPr lang="en-US" dirty="0" err="1"/>
-              <a:t>Edzie</a:t>
-            </a:r>
-            <a:r>
-              <a:rPr lang="en-US" dirty="0"/>
-              <a:t> </a:t>
-            </a:r>
-            <a:endParaRPr lang="en-US" dirty="0" smtClean="0"/>
-          </a:p>
-          <a:p>
-            <a:pPr lvl="1"/>
             <a:r>
               <a:rPr lang="en-US" dirty="0" smtClean="0"/>
               <a:t>University </a:t>
@@ -6252,11 +7208,45 @@
             </a:r>
           </a:p>
           <a:p>
+            <a:r>
+              <a:rPr lang="en-US" dirty="0" smtClean="0"/>
+              <a:t>Societal </a:t>
+            </a:r>
+            <a:r>
+              <a:rPr lang="en-US" dirty="0" smtClean="0"/>
+              <a:t>pressures that prevent women from entering </a:t>
+            </a:r>
+            <a:r>
+              <a:rPr lang="en-US" dirty="0" smtClean="0"/>
+              <a:t>tech:</a:t>
+            </a:r>
+          </a:p>
+          <a:p>
             <a:pPr lvl="1"/>
             <a:r>
               <a:rPr lang="en-US" dirty="0" smtClean="0"/>
-              <a:t>Societal pressures that prevent women from entering tech</a:t>
-            </a:r>
+              <a:t>Explanation of confidence gap</a:t>
+            </a:r>
+          </a:p>
+          <a:p>
+            <a:pPr lvl="1"/>
+            <a:r>
+              <a:rPr lang="en-US" dirty="0" smtClean="0"/>
+              <a:t>Lack of role models</a:t>
+            </a:r>
+          </a:p>
+          <a:p>
+            <a:pPr lvl="1"/>
+            <a:r>
+              <a:rPr lang="en-US" dirty="0" smtClean="0"/>
+              <a:t>No exposure to computer science</a:t>
+            </a:r>
+          </a:p>
+          <a:p>
+            <a:pPr lvl="1"/>
+            <a:endParaRPr lang="en-US" dirty="0" smtClean="0"/>
+          </a:p>
+          <a:p>
             <a:endParaRPr lang="en-US" dirty="0"/>
           </a:p>
         </p:txBody>
@@ -6283,7 +7273,7 @@
         </p:blipFill>
         <p:spPr>
           <a:xfrm>
-            <a:off x="3180442" y="3855980"/>
+            <a:off x="6184900" y="3855980"/>
             <a:ext cx="2540000" cy="2540000"/>
           </a:xfrm>
           <a:prstGeom prst="rect">
@@ -6301,10 +7291,17 @@
   <p:clrMapOvr>
     <a:masterClrMapping/>
   </p:clrMapOvr>
+  <p:timing>
+    <p:tnLst>
+      <p:par>
+        <p:cTn xmlns:p14="http://schemas.microsoft.com/office/powerpoint/2010/main" id="1" dur="indefinite" restart="never" nodeType="tmRoot"/>
+      </p:par>
+    </p:tnLst>
+  </p:timing>
 </p:sld>
 </file>
 
-<file path=ppt/slides/slide7.xml><?xml version="1.0" encoding="utf-8"?>
+<file path=ppt/slides/slide8.xml><?xml version="1.0" encoding="utf-8"?>
 <p:sld xmlns:a="http://schemas.openxmlformats.org/drawingml/2006/main" xmlns:r="http://schemas.openxmlformats.org/officeDocument/2006/relationships" xmlns:p="http://schemas.openxmlformats.org/presentationml/2006/main">
   <p:cSld>
     <p:spTree>
@@ -6338,50 +7335,109 @@
           <a:p>
             <a:r>
               <a:rPr lang="en-US" dirty="0" smtClean="0"/>
-              <a:t>Paradigm 3</a:t>
-            </a:r>
-            <a:endParaRPr lang="en-US" dirty="0"/>
-          </a:p>
-        </p:txBody>
-      </p:sp>
-      <p:sp>
-        <p:nvSpPr>
-          <p:cNvPr id="3" name="Content Placeholder 2"/>
-          <p:cNvSpPr>
-            <a:spLocks noGrp="1"/>
-          </p:cNvSpPr>
-          <p:nvPr>
-            <p:ph idx="1"/>
-          </p:nvPr>
-        </p:nvSpPr>
-        <p:spPr/>
-        <p:txBody>
-          <a:bodyPr/>
-          <a:lstStyle/>
-          <a:p>
-            <a:r>
-              <a:rPr lang="en-US" dirty="0" smtClean="0"/>
-              <a:t>Ellen </a:t>
+              <a:t>Researcher: Ellen </a:t>
             </a:r>
             <a:r>
               <a:rPr lang="en-US" dirty="0" err="1" smtClean="0"/>
               <a:t>Spertus</a:t>
             </a:r>
+            <a:endParaRPr lang="en-US" dirty="0"/>
+          </a:p>
+        </p:txBody>
+      </p:sp>
+      <p:sp>
+        <p:nvSpPr>
+          <p:cNvPr id="3" name="Content Placeholder 2"/>
+          <p:cNvSpPr>
+            <a:spLocks noGrp="1"/>
+          </p:cNvSpPr>
+          <p:nvPr>
+            <p:ph idx="1"/>
+          </p:nvPr>
+        </p:nvSpPr>
+        <p:spPr/>
+        <p:txBody>
+          <a:bodyPr>
+            <a:normAutofit lnSpcReduction="10000"/>
+          </a:bodyPr>
+          <a:lstStyle/>
+          <a:p>
+            <a:r>
+              <a:rPr lang="en-US" dirty="0" smtClean="0"/>
+              <a:t>MIT researcher</a:t>
+            </a:r>
+            <a:endParaRPr lang="en-US" dirty="0"/>
+          </a:p>
+          <a:p>
+            <a:r>
+              <a:rPr lang="en-US" dirty="0" smtClean="0"/>
+              <a:t>Talks about historically </a:t>
+            </a:r>
+            <a:r>
+              <a:rPr lang="en-US" dirty="0" smtClean="0"/>
+              <a:t>low rates of retention in IT/</a:t>
+            </a:r>
+            <a:r>
+              <a:rPr lang="en-US" dirty="0" smtClean="0"/>
+              <a:t>CSRF</a:t>
+            </a:r>
+          </a:p>
+          <a:p>
+            <a:r>
+              <a:rPr lang="en-US" dirty="0" smtClean="0"/>
+              <a:t>Endemic problems:</a:t>
+            </a:r>
+          </a:p>
+          <a:p>
+            <a:pPr lvl="1"/>
+            <a:r>
+              <a:rPr lang="en-US" dirty="0" smtClean="0"/>
+              <a:t>Sexual harassment</a:t>
+            </a:r>
+          </a:p>
+          <a:p>
+            <a:pPr lvl="1"/>
+            <a:r>
+              <a:rPr lang="en-US" dirty="0" smtClean="0"/>
+              <a:t>“Imposter Syndrome”</a:t>
+            </a:r>
+          </a:p>
+          <a:p>
+            <a:pPr lvl="1"/>
+            <a:r>
+              <a:rPr lang="en-US" dirty="0" smtClean="0"/>
+              <a:t>Few women to network</a:t>
+            </a:r>
+          </a:p>
+          <a:p>
+            <a:pPr marL="685800" lvl="2" indent="0">
+              <a:buNone/>
+            </a:pPr>
+            <a:r>
+              <a:rPr lang="en-US" dirty="0" smtClean="0"/>
+              <a:t>with</a:t>
+            </a:r>
             <a:endParaRPr lang="en-US" dirty="0" smtClean="0"/>
           </a:p>
           <a:p>
-            <a:pPr lvl="1"/>
-            <a:r>
-              <a:rPr lang="en-US" dirty="0" smtClean="0"/>
-              <a:t>MIT</a:t>
-            </a:r>
-          </a:p>
-          <a:p>
-            <a:pPr lvl="1"/>
-            <a:r>
-              <a:rPr lang="en-US" dirty="0" smtClean="0"/>
-              <a:t>Historically low rates of retention in IT/CSRF</a:t>
-            </a:r>
+            <a:r>
+              <a:rPr lang="en-US" dirty="0" smtClean="0"/>
+              <a:t>Gender norms and</a:t>
+            </a:r>
+          </a:p>
+          <a:p>
+            <a:pPr marL="349250" lvl="1" indent="0">
+              <a:buNone/>
+            </a:pPr>
+            <a:r>
+              <a:rPr lang="en-US" dirty="0" smtClean="0"/>
+              <a:t>stereotypes</a:t>
+            </a:r>
+          </a:p>
+          <a:p>
+            <a:pPr marL="349250" lvl="1" indent="0">
+              <a:buNone/>
+            </a:pPr>
             <a:endParaRPr lang="en-US" dirty="0"/>
           </a:p>
         </p:txBody>
@@ -6408,7 +7464,7 @@
         </p:blipFill>
         <p:spPr>
           <a:xfrm>
-            <a:off x="2816131" y="3775832"/>
+            <a:off x="4582210" y="3775832"/>
             <a:ext cx="4142690" cy="2761793"/>
           </a:xfrm>
           <a:prstGeom prst="rect">
@@ -6426,10 +7482,17 @@
   <p:clrMapOvr>
     <a:masterClrMapping/>
   </p:clrMapOvr>
+  <p:timing>
+    <p:tnLst>
+      <p:par>
+        <p:cTn xmlns:p14="http://schemas.microsoft.com/office/powerpoint/2010/main" id="1" dur="indefinite" restart="never" nodeType="tmRoot"/>
+      </p:par>
+    </p:tnLst>
+  </p:timing>
 </p:sld>
 </file>
 
-<file path=ppt/slides/slide8.xml><?xml version="1.0" encoding="utf-8"?>
+<file path=ppt/slides/slide9.xml><?xml version="1.0" encoding="utf-8"?>
 <p:sld xmlns:a="http://schemas.openxmlformats.org/drawingml/2006/main" xmlns:r="http://schemas.openxmlformats.org/officeDocument/2006/relationships" xmlns:p="http://schemas.openxmlformats.org/presentationml/2006/main">
   <p:cSld>
     <p:spTree>
@@ -6463,7 +7526,7 @@
           <a:p>
             <a:r>
               <a:rPr lang="en-US" dirty="0" smtClean="0"/>
-              <a:t>Paradigm 4</a:t>
+              <a:t>Model: Girls Who Code</a:t>
             </a:r>
             <a:endParaRPr lang="en-US" dirty="0"/>
           </a:p>
@@ -6493,42 +7556,56 @@
             <a:pPr lvl="1"/>
             <a:r>
               <a:rPr lang="en-US" dirty="0" smtClean="0"/>
-              <a:t>Plan</a:t>
-            </a:r>
+              <a:t>Wildly successful program afterschool tutoring program aimed at women that, as of 2016, helped 27,000 young women get a computer science education</a:t>
+            </a:r>
+            <a:endParaRPr lang="en-US" dirty="0" smtClean="0"/>
           </a:p>
           <a:p>
             <a:pPr lvl="1"/>
             <a:r>
               <a:rPr lang="en-US" dirty="0" smtClean="0"/>
-              <a:t>Population</a:t>
-            </a:r>
+              <a:t>For beginners</a:t>
+            </a:r>
+            <a:endParaRPr lang="en-US" dirty="0" smtClean="0"/>
           </a:p>
           <a:p>
             <a:pPr lvl="1"/>
             <a:r>
               <a:rPr lang="en-US" dirty="0" smtClean="0"/>
-              <a:t>Model</a:t>
+              <a:t>Revenue-positive</a:t>
             </a:r>
           </a:p>
           <a:p>
             <a:pPr lvl="1"/>
             <a:r>
               <a:rPr lang="en-US" dirty="0" smtClean="0"/>
-              <a:t>Budget</a:t>
-            </a:r>
-          </a:p>
-          <a:p>
-            <a:pPr lvl="1"/>
-            <a:r>
-              <a:rPr lang="en-US" dirty="0" smtClean="0"/>
-              <a:t>Success</a:t>
-            </a:r>
-          </a:p>
-          <a:p>
-            <a:pPr marL="349250" lvl="1" indent="0">
+              <a:t>Results:</a:t>
+            </a:r>
+          </a:p>
+          <a:p>
+            <a:pPr lvl="2"/>
+            <a:r>
+              <a:rPr lang="en-US" dirty="0" smtClean="0"/>
+              <a:t>32% increase in </a:t>
+            </a:r>
+          </a:p>
+          <a:p>
+            <a:pPr marL="685800" lvl="2" indent="0">
               <a:buNone/>
             </a:pPr>
+            <a:r>
+              <a:rPr lang="en-US" dirty="0" smtClean="0"/>
+              <a:t>Computer science interest</a:t>
+            </a:r>
             <a:endParaRPr lang="en-US" dirty="0"/>
+          </a:p>
+          <a:p>
+            <a:pPr lvl="2"/>
+            <a:r>
+              <a:rPr lang="en-US" dirty="0" smtClean="0"/>
+              <a:t>Encourages female leaders in tech</a:t>
+            </a:r>
+            <a:endParaRPr lang="en-US" dirty="0" smtClean="0"/>
           </a:p>
         </p:txBody>
       </p:sp>
@@ -6554,8 +7631,8 @@
         </p:blipFill>
         <p:spPr>
           <a:xfrm>
-            <a:off x="3340100" y="4094629"/>
-            <a:ext cx="5384800" cy="2171700"/>
+            <a:off x="4869376" y="3845769"/>
+            <a:ext cx="3855524" cy="1554940"/>
           </a:xfrm>
           <a:prstGeom prst="rect">
             <a:avLst/>
@@ -6572,119 +7649,13 @@
   <p:clrMapOvr>
     <a:masterClrMapping/>
   </p:clrMapOvr>
-</p:sld>
-</file>
-
-<file path=ppt/slides/slide9.xml><?xml version="1.0" encoding="utf-8"?>
-<p:sld xmlns:a="http://schemas.openxmlformats.org/drawingml/2006/main" xmlns:r="http://schemas.openxmlformats.org/officeDocument/2006/relationships" xmlns:p="http://schemas.openxmlformats.org/presentationml/2006/main">
-  <p:cSld>
-    <p:spTree>
-      <p:nvGrpSpPr>
-        <p:cNvPr id="1" name=""/>
-        <p:cNvGrpSpPr/>
-        <p:nvPr/>
-      </p:nvGrpSpPr>
-      <p:grpSpPr>
-        <a:xfrm>
-          <a:off x="0" y="0"/>
-          <a:ext cx="0" cy="0"/>
-          <a:chOff x="0" y="0"/>
-          <a:chExt cx="0" cy="0"/>
-        </a:xfrm>
-      </p:grpSpPr>
-      <p:sp>
-        <p:nvSpPr>
-          <p:cNvPr id="2" name="Title 1"/>
-          <p:cNvSpPr>
-            <a:spLocks noGrp="1"/>
-          </p:cNvSpPr>
-          <p:nvPr>
-            <p:ph type="title"/>
-          </p:nvPr>
-        </p:nvSpPr>
-        <p:spPr/>
-        <p:txBody>
-          <a:bodyPr/>
-          <a:lstStyle/>
-          <a:p>
-            <a:r>
-              <a:rPr lang="en-US" dirty="0" smtClean="0"/>
-              <a:t>Plan</a:t>
-            </a:r>
-            <a:endParaRPr lang="en-US" dirty="0"/>
-          </a:p>
-        </p:txBody>
-      </p:sp>
-      <p:sp>
-        <p:nvSpPr>
-          <p:cNvPr id="3" name="Content Placeholder 2"/>
-          <p:cNvSpPr>
-            <a:spLocks noGrp="1"/>
-          </p:cNvSpPr>
-          <p:nvPr>
-            <p:ph idx="1"/>
-          </p:nvPr>
-        </p:nvSpPr>
-        <p:spPr/>
-        <p:txBody>
-          <a:bodyPr/>
-          <a:lstStyle/>
-          <a:p>
-            <a:r>
-              <a:rPr lang="en-US" dirty="0" smtClean="0"/>
-              <a:t>Afterschool tutoring program for young female students at FRSD</a:t>
-            </a:r>
-          </a:p>
-          <a:p>
-            <a:r>
-              <a:rPr lang="en-US" dirty="0" smtClean="0"/>
-              <a:t>Details:</a:t>
-            </a:r>
-          </a:p>
-          <a:p>
-            <a:pPr lvl="1"/>
-            <a:r>
-              <a:rPr lang="en-US" dirty="0" smtClean="0"/>
-              <a:t>Held at Manalapan/Freehold Township High School Media Centers (access to computers)</a:t>
-            </a:r>
-          </a:p>
-          <a:p>
-            <a:pPr lvl="1"/>
-            <a:r>
-              <a:rPr lang="en-US" dirty="0" smtClean="0"/>
-              <a:t>Over course of academic year, starting at the end of October</a:t>
-            </a:r>
-          </a:p>
-          <a:p>
-            <a:pPr lvl="1"/>
-            <a:r>
-              <a:rPr lang="en-US" dirty="0" smtClean="0"/>
-              <a:t>Funding provided by Google Educational Grant</a:t>
-            </a:r>
-          </a:p>
-          <a:p>
-            <a:pPr lvl="1"/>
-            <a:r>
-              <a:rPr lang="en-US" dirty="0" smtClean="0"/>
-              <a:t>Teachers provided are volunteers by Rutgers/local colleges</a:t>
-            </a:r>
-          </a:p>
-          <a:p>
-            <a:pPr lvl="1"/>
-            <a:endParaRPr lang="en-US" dirty="0" smtClean="0"/>
-          </a:p>
-        </p:txBody>
-      </p:sp>
-    </p:spTree>
-    <p:extLst>
-      <p:ext uri="{BB962C8B-B14F-4D97-AF65-F5344CB8AC3E}">
-        <p14:creationId xmlns:p14="http://schemas.microsoft.com/office/powerpoint/2010/main" val="3828261997"/>
-      </p:ext>
-    </p:extLst>
-  </p:cSld>
-  <p:clrMapOvr>
-    <a:masterClrMapping/>
-  </p:clrMapOvr>
+  <p:timing>
+    <p:tnLst>
+      <p:par>
+        <p:cTn xmlns:p14="http://schemas.microsoft.com/office/powerpoint/2010/main" id="1" dur="indefinite" restart="never" nodeType="tmRoot"/>
+      </p:par>
+    </p:tnLst>
+  </p:timing>
 </p:sld>
 </file>
 

</xml_diff>